<commit_message>
Added details to use plan for config file
</commit_message>
<xml_diff>
--- a/jyn_prompt2_battlespace.pptx
+++ b/jyn_prompt2_battlespace.pptx
@@ -5,7 +5,7 @@
     <p:sldMasterId id="2147483648" r:id="rId1"/>
   </p:sldMasterIdLst>
   <p:notesMasterIdLst>
-    <p:notesMasterId r:id="rId15"/>
+    <p:notesMasterId r:id="rId16"/>
   </p:notesMasterIdLst>
   <p:sldIdLst>
     <p:sldId id="256" r:id="rId2"/>
@@ -14,13 +14,14 @@
     <p:sldId id="265" r:id="rId5"/>
     <p:sldId id="257" r:id="rId6"/>
     <p:sldId id="260" r:id="rId7"/>
-    <p:sldId id="262" r:id="rId8"/>
-    <p:sldId id="261" r:id="rId9"/>
-    <p:sldId id="268" r:id="rId10"/>
-    <p:sldId id="263" r:id="rId11"/>
-    <p:sldId id="264" r:id="rId12"/>
-    <p:sldId id="267" r:id="rId13"/>
-    <p:sldId id="269" r:id="rId14"/>
+    <p:sldId id="270" r:id="rId8"/>
+    <p:sldId id="262" r:id="rId9"/>
+    <p:sldId id="261" r:id="rId10"/>
+    <p:sldId id="268" r:id="rId11"/>
+    <p:sldId id="263" r:id="rId12"/>
+    <p:sldId id="264" r:id="rId13"/>
+    <p:sldId id="267" r:id="rId14"/>
+    <p:sldId id="269" r:id="rId15"/>
   </p:sldIdLst>
   <p:sldSz cx="12192000" cy="6858000"/>
   <p:notesSz cx="6858000" cy="9144000"/>
@@ -985,7 +986,7 @@
           <a:p>
             <a:fld id="{1F64E69B-72B5-41C7-8FC1-F2DE52ADC253}" type="datetimeFigureOut">
               <a:rPr lang="en-US" smtClean="0"/>
-              <a:t>15-Apr-19</a:t>
+              <a:t>17-Apr-19</a:t>
             </a:fld>
             <a:endParaRPr lang="en-US"/>
           </a:p>
@@ -1274,7 +1275,7 @@
           <p:cNvPr id="2" name="Title 1">
             <a:extLst>
               <a:ext uri="{FF2B5EF4-FFF2-40B4-BE49-F238E27FC236}">
-                <a16:creationId xmlns:a16="http://schemas.microsoft.com/office/drawing/2014/main" id="{9114EB7D-F588-4C93-891C-60AAE1D38A35}"/>
+                <a16:creationId xmlns:a16="http://schemas.microsoft.com/office/drawing/2014/main" xmlns="" id="{9114EB7D-F588-4C93-891C-60AAE1D38A35}"/>
               </a:ext>
             </a:extLst>
           </p:cNvPr>
@@ -1311,7 +1312,7 @@
           <p:cNvPr id="3" name="Subtitle 2">
             <a:extLst>
               <a:ext uri="{FF2B5EF4-FFF2-40B4-BE49-F238E27FC236}">
-                <a16:creationId xmlns:a16="http://schemas.microsoft.com/office/drawing/2014/main" id="{CE4F8A8F-A1F1-4945-85CD-903F6D8113BB}"/>
+                <a16:creationId xmlns:a16="http://schemas.microsoft.com/office/drawing/2014/main" xmlns="" id="{CE4F8A8F-A1F1-4945-85CD-903F6D8113BB}"/>
               </a:ext>
             </a:extLst>
           </p:cNvPr>
@@ -1381,7 +1382,7 @@
           <p:cNvPr id="4" name="Date Placeholder 3">
             <a:extLst>
               <a:ext uri="{FF2B5EF4-FFF2-40B4-BE49-F238E27FC236}">
-                <a16:creationId xmlns:a16="http://schemas.microsoft.com/office/drawing/2014/main" id="{49667ED8-3DEF-4EB0-B529-A168F623400A}"/>
+                <a16:creationId xmlns:a16="http://schemas.microsoft.com/office/drawing/2014/main" xmlns="" id="{49667ED8-3DEF-4EB0-B529-A168F623400A}"/>
               </a:ext>
             </a:extLst>
           </p:cNvPr>
@@ -1399,7 +1400,7 @@
           <a:p>
             <a:fld id="{CB33FFEC-1416-460F-800E-EBFB1ABA798B}" type="datetime1">
               <a:rPr lang="en-US" smtClean="0"/>
-              <a:t>15-Apr-19</a:t>
+              <a:t>17-Apr-19</a:t>
             </a:fld>
             <a:endParaRPr lang="en-US"/>
           </a:p>
@@ -1410,7 +1411,7 @@
           <p:cNvPr id="5" name="Footer Placeholder 4">
             <a:extLst>
               <a:ext uri="{FF2B5EF4-FFF2-40B4-BE49-F238E27FC236}">
-                <a16:creationId xmlns:a16="http://schemas.microsoft.com/office/drawing/2014/main" id="{35846C09-E12E-443A-90A7-15474B088F1A}"/>
+                <a16:creationId xmlns:a16="http://schemas.microsoft.com/office/drawing/2014/main" xmlns="" id="{35846C09-E12E-443A-90A7-15474B088F1A}"/>
               </a:ext>
             </a:extLst>
           </p:cNvPr>
@@ -1435,7 +1436,7 @@
           <p:cNvPr id="6" name="Slide Number Placeholder 5">
             <a:extLst>
               <a:ext uri="{FF2B5EF4-FFF2-40B4-BE49-F238E27FC236}">
-                <a16:creationId xmlns:a16="http://schemas.microsoft.com/office/drawing/2014/main" id="{D22717D6-B4FD-4A3B-A725-C42E399FB388}"/>
+                <a16:creationId xmlns:a16="http://schemas.microsoft.com/office/drawing/2014/main" xmlns="" id="{D22717D6-B4FD-4A3B-A725-C42E399FB388}"/>
               </a:ext>
             </a:extLst>
           </p:cNvPr>
@@ -1494,7 +1495,7 @@
           <p:cNvPr id="2" name="Title 1">
             <a:extLst>
               <a:ext uri="{FF2B5EF4-FFF2-40B4-BE49-F238E27FC236}">
-                <a16:creationId xmlns:a16="http://schemas.microsoft.com/office/drawing/2014/main" id="{A88345A5-5C94-4F63-99E8-E767311C6C90}"/>
+                <a16:creationId xmlns:a16="http://schemas.microsoft.com/office/drawing/2014/main" xmlns="" id="{A88345A5-5C94-4F63-99E8-E767311C6C90}"/>
               </a:ext>
             </a:extLst>
           </p:cNvPr>
@@ -1522,7 +1523,7 @@
           <p:cNvPr id="3" name="Vertical Text Placeholder 2">
             <a:extLst>
               <a:ext uri="{FF2B5EF4-FFF2-40B4-BE49-F238E27FC236}">
-                <a16:creationId xmlns:a16="http://schemas.microsoft.com/office/drawing/2014/main" id="{C5B09A39-EB7D-409E-ACAA-F098B4913446}"/>
+                <a16:creationId xmlns:a16="http://schemas.microsoft.com/office/drawing/2014/main" xmlns="" id="{C5B09A39-EB7D-409E-ACAA-F098B4913446}"/>
               </a:ext>
             </a:extLst>
           </p:cNvPr>
@@ -1579,7 +1580,7 @@
           <p:cNvPr id="4" name="Date Placeholder 3">
             <a:extLst>
               <a:ext uri="{FF2B5EF4-FFF2-40B4-BE49-F238E27FC236}">
-                <a16:creationId xmlns:a16="http://schemas.microsoft.com/office/drawing/2014/main" id="{2E4F182D-F8BC-4709-B8A4-44552181FD08}"/>
+                <a16:creationId xmlns:a16="http://schemas.microsoft.com/office/drawing/2014/main" xmlns="" id="{2E4F182D-F8BC-4709-B8A4-44552181FD08}"/>
               </a:ext>
             </a:extLst>
           </p:cNvPr>
@@ -1597,7 +1598,7 @@
           <a:p>
             <a:fld id="{9304D236-8A52-4202-8D1E-73016EEC9BEC}" type="datetime1">
               <a:rPr lang="en-US" smtClean="0"/>
-              <a:t>15-Apr-19</a:t>
+              <a:t>17-Apr-19</a:t>
             </a:fld>
             <a:endParaRPr lang="en-US"/>
           </a:p>
@@ -1608,7 +1609,7 @@
           <p:cNvPr id="5" name="Footer Placeholder 4">
             <a:extLst>
               <a:ext uri="{FF2B5EF4-FFF2-40B4-BE49-F238E27FC236}">
-                <a16:creationId xmlns:a16="http://schemas.microsoft.com/office/drawing/2014/main" id="{DD54E706-2662-4CD4-B5C5-2510EFC8D597}"/>
+                <a16:creationId xmlns:a16="http://schemas.microsoft.com/office/drawing/2014/main" xmlns="" id="{DD54E706-2662-4CD4-B5C5-2510EFC8D597}"/>
               </a:ext>
             </a:extLst>
           </p:cNvPr>
@@ -1633,7 +1634,7 @@
           <p:cNvPr id="6" name="Slide Number Placeholder 5">
             <a:extLst>
               <a:ext uri="{FF2B5EF4-FFF2-40B4-BE49-F238E27FC236}">
-                <a16:creationId xmlns:a16="http://schemas.microsoft.com/office/drawing/2014/main" id="{80BDF262-5154-4D06-865E-00A75A1E16E0}"/>
+                <a16:creationId xmlns:a16="http://schemas.microsoft.com/office/drawing/2014/main" xmlns="" id="{80BDF262-5154-4D06-865E-00A75A1E16E0}"/>
               </a:ext>
             </a:extLst>
           </p:cNvPr>
@@ -1692,7 +1693,7 @@
           <p:cNvPr id="2" name="Vertical Title 1">
             <a:extLst>
               <a:ext uri="{FF2B5EF4-FFF2-40B4-BE49-F238E27FC236}">
-                <a16:creationId xmlns:a16="http://schemas.microsoft.com/office/drawing/2014/main" id="{E2F5D572-0105-48B1-B333-BA24217A429C}"/>
+                <a16:creationId xmlns:a16="http://schemas.microsoft.com/office/drawing/2014/main" xmlns="" id="{E2F5D572-0105-48B1-B333-BA24217A429C}"/>
               </a:ext>
             </a:extLst>
           </p:cNvPr>
@@ -1725,7 +1726,7 @@
           <p:cNvPr id="3" name="Vertical Text Placeholder 2">
             <a:extLst>
               <a:ext uri="{FF2B5EF4-FFF2-40B4-BE49-F238E27FC236}">
-                <a16:creationId xmlns:a16="http://schemas.microsoft.com/office/drawing/2014/main" id="{A6033702-D3BD-410B-97B5-8EAE73F0E702}"/>
+                <a16:creationId xmlns:a16="http://schemas.microsoft.com/office/drawing/2014/main" xmlns="" id="{A6033702-D3BD-410B-97B5-8EAE73F0E702}"/>
               </a:ext>
             </a:extLst>
           </p:cNvPr>
@@ -1787,7 +1788,7 @@
           <p:cNvPr id="4" name="Date Placeholder 3">
             <a:extLst>
               <a:ext uri="{FF2B5EF4-FFF2-40B4-BE49-F238E27FC236}">
-                <a16:creationId xmlns:a16="http://schemas.microsoft.com/office/drawing/2014/main" id="{DF154C8E-0F90-4FE2-92C0-38D7784E9FFE}"/>
+                <a16:creationId xmlns:a16="http://schemas.microsoft.com/office/drawing/2014/main" xmlns="" id="{DF154C8E-0F90-4FE2-92C0-38D7784E9FFE}"/>
               </a:ext>
             </a:extLst>
           </p:cNvPr>
@@ -1805,7 +1806,7 @@
           <a:p>
             <a:fld id="{6EEA425E-7833-496E-913C-158DE16B5986}" type="datetime1">
               <a:rPr lang="en-US" smtClean="0"/>
-              <a:t>15-Apr-19</a:t>
+              <a:t>17-Apr-19</a:t>
             </a:fld>
             <a:endParaRPr lang="en-US"/>
           </a:p>
@@ -1816,7 +1817,7 @@
           <p:cNvPr id="5" name="Footer Placeholder 4">
             <a:extLst>
               <a:ext uri="{FF2B5EF4-FFF2-40B4-BE49-F238E27FC236}">
-                <a16:creationId xmlns:a16="http://schemas.microsoft.com/office/drawing/2014/main" id="{09D47F46-6AE1-49CF-A1F8-45834A2DF4BF}"/>
+                <a16:creationId xmlns:a16="http://schemas.microsoft.com/office/drawing/2014/main" xmlns="" id="{09D47F46-6AE1-49CF-A1F8-45834A2DF4BF}"/>
               </a:ext>
             </a:extLst>
           </p:cNvPr>
@@ -1841,7 +1842,7 @@
           <p:cNvPr id="6" name="Slide Number Placeholder 5">
             <a:extLst>
               <a:ext uri="{FF2B5EF4-FFF2-40B4-BE49-F238E27FC236}">
-                <a16:creationId xmlns:a16="http://schemas.microsoft.com/office/drawing/2014/main" id="{EF1019EB-BFDD-42B4-80C0-1A26FFA36779}"/>
+                <a16:creationId xmlns:a16="http://schemas.microsoft.com/office/drawing/2014/main" xmlns="" id="{EF1019EB-BFDD-42B4-80C0-1A26FFA36779}"/>
               </a:ext>
             </a:extLst>
           </p:cNvPr>
@@ -1900,7 +1901,7 @@
           <p:cNvPr id="2" name="Title 1">
             <a:extLst>
               <a:ext uri="{FF2B5EF4-FFF2-40B4-BE49-F238E27FC236}">
-                <a16:creationId xmlns:a16="http://schemas.microsoft.com/office/drawing/2014/main" id="{6206923F-680C-4A23-B70B-8B55F2F75057}"/>
+                <a16:creationId xmlns:a16="http://schemas.microsoft.com/office/drawing/2014/main" xmlns="" id="{6206923F-680C-4A23-B70B-8B55F2F75057}"/>
               </a:ext>
             </a:extLst>
           </p:cNvPr>
@@ -1928,7 +1929,7 @@
           <p:cNvPr id="3" name="Content Placeholder 2">
             <a:extLst>
               <a:ext uri="{FF2B5EF4-FFF2-40B4-BE49-F238E27FC236}">
-                <a16:creationId xmlns:a16="http://schemas.microsoft.com/office/drawing/2014/main" id="{C0455561-3FA1-4AEF-8FFF-56C86FE4A09E}"/>
+                <a16:creationId xmlns:a16="http://schemas.microsoft.com/office/drawing/2014/main" xmlns="" id="{C0455561-3FA1-4AEF-8FFF-56C86FE4A09E}"/>
               </a:ext>
             </a:extLst>
           </p:cNvPr>
@@ -1985,7 +1986,7 @@
           <p:cNvPr id="4" name="Date Placeholder 3">
             <a:extLst>
               <a:ext uri="{FF2B5EF4-FFF2-40B4-BE49-F238E27FC236}">
-                <a16:creationId xmlns:a16="http://schemas.microsoft.com/office/drawing/2014/main" id="{717E1BE9-E3D6-40FE-9FA3-348F2E794A99}"/>
+                <a16:creationId xmlns:a16="http://schemas.microsoft.com/office/drawing/2014/main" xmlns="" id="{717E1BE9-E3D6-40FE-9FA3-348F2E794A99}"/>
               </a:ext>
             </a:extLst>
           </p:cNvPr>
@@ -2003,7 +2004,7 @@
           <a:p>
             <a:fld id="{C1F5DAB7-AC85-4932-A327-8027A3F38DC7}" type="datetime1">
               <a:rPr lang="en-US" smtClean="0"/>
-              <a:t>15-Apr-19</a:t>
+              <a:t>17-Apr-19</a:t>
             </a:fld>
             <a:endParaRPr lang="en-US"/>
           </a:p>
@@ -2014,7 +2015,7 @@
           <p:cNvPr id="5" name="Footer Placeholder 4">
             <a:extLst>
               <a:ext uri="{FF2B5EF4-FFF2-40B4-BE49-F238E27FC236}">
-                <a16:creationId xmlns:a16="http://schemas.microsoft.com/office/drawing/2014/main" id="{2A215AA2-E2A4-4DD9-A7CF-35F4BA31CB0E}"/>
+                <a16:creationId xmlns:a16="http://schemas.microsoft.com/office/drawing/2014/main" xmlns="" id="{2A215AA2-E2A4-4DD9-A7CF-35F4BA31CB0E}"/>
               </a:ext>
             </a:extLst>
           </p:cNvPr>
@@ -2039,7 +2040,7 @@
           <p:cNvPr id="6" name="Slide Number Placeholder 5">
             <a:extLst>
               <a:ext uri="{FF2B5EF4-FFF2-40B4-BE49-F238E27FC236}">
-                <a16:creationId xmlns:a16="http://schemas.microsoft.com/office/drawing/2014/main" id="{41DE9AC5-5A7B-42EF-B680-B278346E8E31}"/>
+                <a16:creationId xmlns:a16="http://schemas.microsoft.com/office/drawing/2014/main" xmlns="" id="{41DE9AC5-5A7B-42EF-B680-B278346E8E31}"/>
               </a:ext>
             </a:extLst>
           </p:cNvPr>
@@ -2098,7 +2099,7 @@
           <p:cNvPr id="2" name="Title 1">
             <a:extLst>
               <a:ext uri="{FF2B5EF4-FFF2-40B4-BE49-F238E27FC236}">
-                <a16:creationId xmlns:a16="http://schemas.microsoft.com/office/drawing/2014/main" id="{89009F07-1A34-4796-AF01-CF20C6AC4472}"/>
+                <a16:creationId xmlns:a16="http://schemas.microsoft.com/office/drawing/2014/main" xmlns="" id="{89009F07-1A34-4796-AF01-CF20C6AC4472}"/>
               </a:ext>
             </a:extLst>
           </p:cNvPr>
@@ -2135,7 +2136,7 @@
           <p:cNvPr id="3" name="Text Placeholder 2">
             <a:extLst>
               <a:ext uri="{FF2B5EF4-FFF2-40B4-BE49-F238E27FC236}">
-                <a16:creationId xmlns:a16="http://schemas.microsoft.com/office/drawing/2014/main" id="{F7DBC8FC-6846-4A02-B98D-8F3E824FDA0F}"/>
+                <a16:creationId xmlns:a16="http://schemas.microsoft.com/office/drawing/2014/main" xmlns="" id="{F7DBC8FC-6846-4A02-B98D-8F3E824FDA0F}"/>
               </a:ext>
             </a:extLst>
           </p:cNvPr>
@@ -2260,7 +2261,7 @@
           <p:cNvPr id="4" name="Date Placeholder 3">
             <a:extLst>
               <a:ext uri="{FF2B5EF4-FFF2-40B4-BE49-F238E27FC236}">
-                <a16:creationId xmlns:a16="http://schemas.microsoft.com/office/drawing/2014/main" id="{13482302-0B24-47BC-BAA9-C47D56778583}"/>
+                <a16:creationId xmlns:a16="http://schemas.microsoft.com/office/drawing/2014/main" xmlns="" id="{13482302-0B24-47BC-BAA9-C47D56778583}"/>
               </a:ext>
             </a:extLst>
           </p:cNvPr>
@@ -2278,7 +2279,7 @@
           <a:p>
             <a:fld id="{FF3DE4CA-22EC-4B0C-8443-09B920FC15D1}" type="datetime1">
               <a:rPr lang="en-US" smtClean="0"/>
-              <a:t>15-Apr-19</a:t>
+              <a:t>17-Apr-19</a:t>
             </a:fld>
             <a:endParaRPr lang="en-US"/>
           </a:p>
@@ -2289,7 +2290,7 @@
           <p:cNvPr id="5" name="Footer Placeholder 4">
             <a:extLst>
               <a:ext uri="{FF2B5EF4-FFF2-40B4-BE49-F238E27FC236}">
-                <a16:creationId xmlns:a16="http://schemas.microsoft.com/office/drawing/2014/main" id="{416E4503-A336-4D6A-81C8-153919D960CE}"/>
+                <a16:creationId xmlns:a16="http://schemas.microsoft.com/office/drawing/2014/main" xmlns="" id="{416E4503-A336-4D6A-81C8-153919D960CE}"/>
               </a:ext>
             </a:extLst>
           </p:cNvPr>
@@ -2314,7 +2315,7 @@
           <p:cNvPr id="6" name="Slide Number Placeholder 5">
             <a:extLst>
               <a:ext uri="{FF2B5EF4-FFF2-40B4-BE49-F238E27FC236}">
-                <a16:creationId xmlns:a16="http://schemas.microsoft.com/office/drawing/2014/main" id="{1F4FA3B7-F6BB-4D8E-ADD4-A074816E27CA}"/>
+                <a16:creationId xmlns:a16="http://schemas.microsoft.com/office/drawing/2014/main" xmlns="" id="{1F4FA3B7-F6BB-4D8E-ADD4-A074816E27CA}"/>
               </a:ext>
             </a:extLst>
           </p:cNvPr>
@@ -2373,7 +2374,7 @@
           <p:cNvPr id="2" name="Title 1">
             <a:extLst>
               <a:ext uri="{FF2B5EF4-FFF2-40B4-BE49-F238E27FC236}">
-                <a16:creationId xmlns:a16="http://schemas.microsoft.com/office/drawing/2014/main" id="{45D2CB93-06B5-49FF-9B9B-0951616A54C8}"/>
+                <a16:creationId xmlns:a16="http://schemas.microsoft.com/office/drawing/2014/main" xmlns="" id="{45D2CB93-06B5-49FF-9B9B-0951616A54C8}"/>
               </a:ext>
             </a:extLst>
           </p:cNvPr>
@@ -2401,7 +2402,7 @@
           <p:cNvPr id="3" name="Content Placeholder 2">
             <a:extLst>
               <a:ext uri="{FF2B5EF4-FFF2-40B4-BE49-F238E27FC236}">
-                <a16:creationId xmlns:a16="http://schemas.microsoft.com/office/drawing/2014/main" id="{B3C14962-F57D-49D0-862A-34FAB73BDE9A}"/>
+                <a16:creationId xmlns:a16="http://schemas.microsoft.com/office/drawing/2014/main" xmlns="" id="{B3C14962-F57D-49D0-862A-34FAB73BDE9A}"/>
               </a:ext>
             </a:extLst>
           </p:cNvPr>
@@ -2463,7 +2464,7 @@
           <p:cNvPr id="4" name="Content Placeholder 3">
             <a:extLst>
               <a:ext uri="{FF2B5EF4-FFF2-40B4-BE49-F238E27FC236}">
-                <a16:creationId xmlns:a16="http://schemas.microsoft.com/office/drawing/2014/main" id="{468B5542-592F-4DB6-9EE5-A994091297CF}"/>
+                <a16:creationId xmlns:a16="http://schemas.microsoft.com/office/drawing/2014/main" xmlns="" id="{468B5542-592F-4DB6-9EE5-A994091297CF}"/>
               </a:ext>
             </a:extLst>
           </p:cNvPr>
@@ -2525,7 +2526,7 @@
           <p:cNvPr id="5" name="Date Placeholder 4">
             <a:extLst>
               <a:ext uri="{FF2B5EF4-FFF2-40B4-BE49-F238E27FC236}">
-                <a16:creationId xmlns:a16="http://schemas.microsoft.com/office/drawing/2014/main" id="{AEB585DD-D048-4F8A-80E8-E34EECFD6861}"/>
+                <a16:creationId xmlns:a16="http://schemas.microsoft.com/office/drawing/2014/main" xmlns="" id="{AEB585DD-D048-4F8A-80E8-E34EECFD6861}"/>
               </a:ext>
             </a:extLst>
           </p:cNvPr>
@@ -2543,7 +2544,7 @@
           <a:p>
             <a:fld id="{5F05D9A9-8937-4F69-80BD-46B9C785B7EE}" type="datetime1">
               <a:rPr lang="en-US" smtClean="0"/>
-              <a:t>15-Apr-19</a:t>
+              <a:t>17-Apr-19</a:t>
             </a:fld>
             <a:endParaRPr lang="en-US"/>
           </a:p>
@@ -2554,7 +2555,7 @@
           <p:cNvPr id="6" name="Footer Placeholder 5">
             <a:extLst>
               <a:ext uri="{FF2B5EF4-FFF2-40B4-BE49-F238E27FC236}">
-                <a16:creationId xmlns:a16="http://schemas.microsoft.com/office/drawing/2014/main" id="{789902AF-14A6-4D8E-A29F-487296A0337E}"/>
+                <a16:creationId xmlns:a16="http://schemas.microsoft.com/office/drawing/2014/main" xmlns="" id="{789902AF-14A6-4D8E-A29F-487296A0337E}"/>
               </a:ext>
             </a:extLst>
           </p:cNvPr>
@@ -2579,7 +2580,7 @@
           <p:cNvPr id="7" name="Slide Number Placeholder 6">
             <a:extLst>
               <a:ext uri="{FF2B5EF4-FFF2-40B4-BE49-F238E27FC236}">
-                <a16:creationId xmlns:a16="http://schemas.microsoft.com/office/drawing/2014/main" id="{367E0904-55E3-482E-A76C-E6D19512EF26}"/>
+                <a16:creationId xmlns:a16="http://schemas.microsoft.com/office/drawing/2014/main" xmlns="" id="{367E0904-55E3-482E-A76C-E6D19512EF26}"/>
               </a:ext>
             </a:extLst>
           </p:cNvPr>
@@ -2638,7 +2639,7 @@
           <p:cNvPr id="2" name="Title 1">
             <a:extLst>
               <a:ext uri="{FF2B5EF4-FFF2-40B4-BE49-F238E27FC236}">
-                <a16:creationId xmlns:a16="http://schemas.microsoft.com/office/drawing/2014/main" id="{C9F99BCC-8E43-499D-86B0-9B51C8BC6AF8}"/>
+                <a16:creationId xmlns:a16="http://schemas.microsoft.com/office/drawing/2014/main" xmlns="" id="{C9F99BCC-8E43-499D-86B0-9B51C8BC6AF8}"/>
               </a:ext>
             </a:extLst>
           </p:cNvPr>
@@ -2671,7 +2672,7 @@
           <p:cNvPr id="3" name="Text Placeholder 2">
             <a:extLst>
               <a:ext uri="{FF2B5EF4-FFF2-40B4-BE49-F238E27FC236}">
-                <a16:creationId xmlns:a16="http://schemas.microsoft.com/office/drawing/2014/main" id="{D743141E-FE9B-429E-B2BF-64C44B1B3425}"/>
+                <a16:creationId xmlns:a16="http://schemas.microsoft.com/office/drawing/2014/main" xmlns="" id="{D743141E-FE9B-429E-B2BF-64C44B1B3425}"/>
               </a:ext>
             </a:extLst>
           </p:cNvPr>
@@ -2742,7 +2743,7 @@
           <p:cNvPr id="4" name="Content Placeholder 3">
             <a:extLst>
               <a:ext uri="{FF2B5EF4-FFF2-40B4-BE49-F238E27FC236}">
-                <a16:creationId xmlns:a16="http://schemas.microsoft.com/office/drawing/2014/main" id="{A4CF6AF9-4246-4ED8-B976-75003026AAA1}"/>
+                <a16:creationId xmlns:a16="http://schemas.microsoft.com/office/drawing/2014/main" xmlns="" id="{A4CF6AF9-4246-4ED8-B976-75003026AAA1}"/>
               </a:ext>
             </a:extLst>
           </p:cNvPr>
@@ -2804,7 +2805,7 @@
           <p:cNvPr id="5" name="Text Placeholder 4">
             <a:extLst>
               <a:ext uri="{FF2B5EF4-FFF2-40B4-BE49-F238E27FC236}">
-                <a16:creationId xmlns:a16="http://schemas.microsoft.com/office/drawing/2014/main" id="{9E0DE512-2E66-418A-87C7-F472BA92DF91}"/>
+                <a16:creationId xmlns:a16="http://schemas.microsoft.com/office/drawing/2014/main" xmlns="" id="{9E0DE512-2E66-418A-87C7-F472BA92DF91}"/>
               </a:ext>
             </a:extLst>
           </p:cNvPr>
@@ -2875,7 +2876,7 @@
           <p:cNvPr id="6" name="Content Placeholder 5">
             <a:extLst>
               <a:ext uri="{FF2B5EF4-FFF2-40B4-BE49-F238E27FC236}">
-                <a16:creationId xmlns:a16="http://schemas.microsoft.com/office/drawing/2014/main" id="{69FAF5B6-F403-4B8D-8824-E1963585A28B}"/>
+                <a16:creationId xmlns:a16="http://schemas.microsoft.com/office/drawing/2014/main" xmlns="" id="{69FAF5B6-F403-4B8D-8824-E1963585A28B}"/>
               </a:ext>
             </a:extLst>
           </p:cNvPr>
@@ -2937,7 +2938,7 @@
           <p:cNvPr id="7" name="Date Placeholder 6">
             <a:extLst>
               <a:ext uri="{FF2B5EF4-FFF2-40B4-BE49-F238E27FC236}">
-                <a16:creationId xmlns:a16="http://schemas.microsoft.com/office/drawing/2014/main" id="{C061832E-7FC9-4232-A55F-AC741A886E11}"/>
+                <a16:creationId xmlns:a16="http://schemas.microsoft.com/office/drawing/2014/main" xmlns="" id="{C061832E-7FC9-4232-A55F-AC741A886E11}"/>
               </a:ext>
             </a:extLst>
           </p:cNvPr>
@@ -2955,7 +2956,7 @@
           <a:p>
             <a:fld id="{310F5672-1927-40F9-84B5-0E310711E286}" type="datetime1">
               <a:rPr lang="en-US" smtClean="0"/>
-              <a:t>15-Apr-19</a:t>
+              <a:t>17-Apr-19</a:t>
             </a:fld>
             <a:endParaRPr lang="en-US"/>
           </a:p>
@@ -2966,7 +2967,7 @@
           <p:cNvPr id="8" name="Footer Placeholder 7">
             <a:extLst>
               <a:ext uri="{FF2B5EF4-FFF2-40B4-BE49-F238E27FC236}">
-                <a16:creationId xmlns:a16="http://schemas.microsoft.com/office/drawing/2014/main" id="{A336723F-778F-475D-9761-F9F61329AC27}"/>
+                <a16:creationId xmlns:a16="http://schemas.microsoft.com/office/drawing/2014/main" xmlns="" id="{A336723F-778F-475D-9761-F9F61329AC27}"/>
               </a:ext>
             </a:extLst>
           </p:cNvPr>
@@ -2991,7 +2992,7 @@
           <p:cNvPr id="9" name="Slide Number Placeholder 8">
             <a:extLst>
               <a:ext uri="{FF2B5EF4-FFF2-40B4-BE49-F238E27FC236}">
-                <a16:creationId xmlns:a16="http://schemas.microsoft.com/office/drawing/2014/main" id="{917D0C8E-8F6C-45CF-AF2D-C9F089568267}"/>
+                <a16:creationId xmlns:a16="http://schemas.microsoft.com/office/drawing/2014/main" xmlns="" id="{917D0C8E-8F6C-45CF-AF2D-C9F089568267}"/>
               </a:ext>
             </a:extLst>
           </p:cNvPr>
@@ -3050,7 +3051,7 @@
           <p:cNvPr id="2" name="Title 1">
             <a:extLst>
               <a:ext uri="{FF2B5EF4-FFF2-40B4-BE49-F238E27FC236}">
-                <a16:creationId xmlns:a16="http://schemas.microsoft.com/office/drawing/2014/main" id="{DA68444B-432D-4846-86AD-2C1B0647F999}"/>
+                <a16:creationId xmlns:a16="http://schemas.microsoft.com/office/drawing/2014/main" xmlns="" id="{DA68444B-432D-4846-86AD-2C1B0647F999}"/>
               </a:ext>
             </a:extLst>
           </p:cNvPr>
@@ -3078,7 +3079,7 @@
           <p:cNvPr id="3" name="Date Placeholder 2">
             <a:extLst>
               <a:ext uri="{FF2B5EF4-FFF2-40B4-BE49-F238E27FC236}">
-                <a16:creationId xmlns:a16="http://schemas.microsoft.com/office/drawing/2014/main" id="{D624A97D-71BE-4FFC-AED8-2C359A7DB440}"/>
+                <a16:creationId xmlns:a16="http://schemas.microsoft.com/office/drawing/2014/main" xmlns="" id="{D624A97D-71BE-4FFC-AED8-2C359A7DB440}"/>
               </a:ext>
             </a:extLst>
           </p:cNvPr>
@@ -3096,7 +3097,7 @@
           <a:p>
             <a:fld id="{5E98B13D-AEF8-49AF-A173-07D6A9333665}" type="datetime1">
               <a:rPr lang="en-US" smtClean="0"/>
-              <a:t>15-Apr-19</a:t>
+              <a:t>17-Apr-19</a:t>
             </a:fld>
             <a:endParaRPr lang="en-US"/>
           </a:p>
@@ -3107,7 +3108,7 @@
           <p:cNvPr id="4" name="Footer Placeholder 3">
             <a:extLst>
               <a:ext uri="{FF2B5EF4-FFF2-40B4-BE49-F238E27FC236}">
-                <a16:creationId xmlns:a16="http://schemas.microsoft.com/office/drawing/2014/main" id="{F6587981-D330-4922-93EE-8C3E0589BE8C}"/>
+                <a16:creationId xmlns:a16="http://schemas.microsoft.com/office/drawing/2014/main" xmlns="" id="{F6587981-D330-4922-93EE-8C3E0589BE8C}"/>
               </a:ext>
             </a:extLst>
           </p:cNvPr>
@@ -3132,7 +3133,7 @@
           <p:cNvPr id="5" name="Slide Number Placeholder 4">
             <a:extLst>
               <a:ext uri="{FF2B5EF4-FFF2-40B4-BE49-F238E27FC236}">
-                <a16:creationId xmlns:a16="http://schemas.microsoft.com/office/drawing/2014/main" id="{9CC95FCC-4A6B-450B-9F2A-3A73CBD3FA88}"/>
+                <a16:creationId xmlns:a16="http://schemas.microsoft.com/office/drawing/2014/main" xmlns="" id="{9CC95FCC-4A6B-450B-9F2A-3A73CBD3FA88}"/>
               </a:ext>
             </a:extLst>
           </p:cNvPr>
@@ -3191,7 +3192,7 @@
           <p:cNvPr id="2" name="Date Placeholder 1">
             <a:extLst>
               <a:ext uri="{FF2B5EF4-FFF2-40B4-BE49-F238E27FC236}">
-                <a16:creationId xmlns:a16="http://schemas.microsoft.com/office/drawing/2014/main" id="{C63EEB87-58F1-4CA6-94AD-4AD409959124}"/>
+                <a16:creationId xmlns:a16="http://schemas.microsoft.com/office/drawing/2014/main" xmlns="" id="{C63EEB87-58F1-4CA6-94AD-4AD409959124}"/>
               </a:ext>
             </a:extLst>
           </p:cNvPr>
@@ -3209,7 +3210,7 @@
           <a:p>
             <a:fld id="{D8DD5282-D14F-4500-8FC0-9D5C37495F30}" type="datetime1">
               <a:rPr lang="en-US" smtClean="0"/>
-              <a:t>15-Apr-19</a:t>
+              <a:t>17-Apr-19</a:t>
             </a:fld>
             <a:endParaRPr lang="en-US"/>
           </a:p>
@@ -3220,7 +3221,7 @@
           <p:cNvPr id="3" name="Footer Placeholder 2">
             <a:extLst>
               <a:ext uri="{FF2B5EF4-FFF2-40B4-BE49-F238E27FC236}">
-                <a16:creationId xmlns:a16="http://schemas.microsoft.com/office/drawing/2014/main" id="{FEFDC677-36CC-4295-95AB-F3AD91FD1B6C}"/>
+                <a16:creationId xmlns:a16="http://schemas.microsoft.com/office/drawing/2014/main" xmlns="" id="{FEFDC677-36CC-4295-95AB-F3AD91FD1B6C}"/>
               </a:ext>
             </a:extLst>
           </p:cNvPr>
@@ -3245,7 +3246,7 @@
           <p:cNvPr id="4" name="Slide Number Placeholder 3">
             <a:extLst>
               <a:ext uri="{FF2B5EF4-FFF2-40B4-BE49-F238E27FC236}">
-                <a16:creationId xmlns:a16="http://schemas.microsoft.com/office/drawing/2014/main" id="{B20EA51C-973E-4A97-96B3-AAE018C3E3FF}"/>
+                <a16:creationId xmlns:a16="http://schemas.microsoft.com/office/drawing/2014/main" xmlns="" id="{B20EA51C-973E-4A97-96B3-AAE018C3E3FF}"/>
               </a:ext>
             </a:extLst>
           </p:cNvPr>
@@ -3304,7 +3305,7 @@
           <p:cNvPr id="2" name="Title 1">
             <a:extLst>
               <a:ext uri="{FF2B5EF4-FFF2-40B4-BE49-F238E27FC236}">
-                <a16:creationId xmlns:a16="http://schemas.microsoft.com/office/drawing/2014/main" id="{E59FEEA7-76E0-46E0-A46D-B96385071320}"/>
+                <a16:creationId xmlns:a16="http://schemas.microsoft.com/office/drawing/2014/main" xmlns="" id="{E59FEEA7-76E0-46E0-A46D-B96385071320}"/>
               </a:ext>
             </a:extLst>
           </p:cNvPr>
@@ -3341,7 +3342,7 @@
           <p:cNvPr id="3" name="Content Placeholder 2">
             <a:extLst>
               <a:ext uri="{FF2B5EF4-FFF2-40B4-BE49-F238E27FC236}">
-                <a16:creationId xmlns:a16="http://schemas.microsoft.com/office/drawing/2014/main" id="{CB9CC1A3-FA4B-4101-ACAF-D72AF62ADDD1}"/>
+                <a16:creationId xmlns:a16="http://schemas.microsoft.com/office/drawing/2014/main" xmlns="" id="{CB9CC1A3-FA4B-4101-ACAF-D72AF62ADDD1}"/>
               </a:ext>
             </a:extLst>
           </p:cNvPr>
@@ -3431,7 +3432,7 @@
           <p:cNvPr id="4" name="Text Placeholder 3">
             <a:extLst>
               <a:ext uri="{FF2B5EF4-FFF2-40B4-BE49-F238E27FC236}">
-                <a16:creationId xmlns:a16="http://schemas.microsoft.com/office/drawing/2014/main" id="{FA30447C-7F34-413C-85BF-0D08AC571151}"/>
+                <a16:creationId xmlns:a16="http://schemas.microsoft.com/office/drawing/2014/main" xmlns="" id="{FA30447C-7F34-413C-85BF-0D08AC571151}"/>
               </a:ext>
             </a:extLst>
           </p:cNvPr>
@@ -3502,7 +3503,7 @@
           <p:cNvPr id="5" name="Date Placeholder 4">
             <a:extLst>
               <a:ext uri="{FF2B5EF4-FFF2-40B4-BE49-F238E27FC236}">
-                <a16:creationId xmlns:a16="http://schemas.microsoft.com/office/drawing/2014/main" id="{6C543E21-6287-43CB-97D4-82805E0BC4FA}"/>
+                <a16:creationId xmlns:a16="http://schemas.microsoft.com/office/drawing/2014/main" xmlns="" id="{6C543E21-6287-43CB-97D4-82805E0BC4FA}"/>
               </a:ext>
             </a:extLst>
           </p:cNvPr>
@@ -3520,7 +3521,7 @@
           <a:p>
             <a:fld id="{AFB07FF8-FFAE-44FD-9C38-A9603B7BBB50}" type="datetime1">
               <a:rPr lang="en-US" smtClean="0"/>
-              <a:t>15-Apr-19</a:t>
+              <a:t>17-Apr-19</a:t>
             </a:fld>
             <a:endParaRPr lang="en-US"/>
           </a:p>
@@ -3531,7 +3532,7 @@
           <p:cNvPr id="6" name="Footer Placeholder 5">
             <a:extLst>
               <a:ext uri="{FF2B5EF4-FFF2-40B4-BE49-F238E27FC236}">
-                <a16:creationId xmlns:a16="http://schemas.microsoft.com/office/drawing/2014/main" id="{8EFDEB7F-DD61-4271-AD7D-3848B0A1079A}"/>
+                <a16:creationId xmlns:a16="http://schemas.microsoft.com/office/drawing/2014/main" xmlns="" id="{8EFDEB7F-DD61-4271-AD7D-3848B0A1079A}"/>
               </a:ext>
             </a:extLst>
           </p:cNvPr>
@@ -3556,7 +3557,7 @@
           <p:cNvPr id="7" name="Slide Number Placeholder 6">
             <a:extLst>
               <a:ext uri="{FF2B5EF4-FFF2-40B4-BE49-F238E27FC236}">
-                <a16:creationId xmlns:a16="http://schemas.microsoft.com/office/drawing/2014/main" id="{38360ACA-D842-406A-9238-24F8E00ECF04}"/>
+                <a16:creationId xmlns:a16="http://schemas.microsoft.com/office/drawing/2014/main" xmlns="" id="{38360ACA-D842-406A-9238-24F8E00ECF04}"/>
               </a:ext>
             </a:extLst>
           </p:cNvPr>
@@ -3615,7 +3616,7 @@
           <p:cNvPr id="2" name="Title 1">
             <a:extLst>
               <a:ext uri="{FF2B5EF4-FFF2-40B4-BE49-F238E27FC236}">
-                <a16:creationId xmlns:a16="http://schemas.microsoft.com/office/drawing/2014/main" id="{06EA6771-06AA-4903-A6AE-95D358994F8F}"/>
+                <a16:creationId xmlns:a16="http://schemas.microsoft.com/office/drawing/2014/main" xmlns="" id="{06EA6771-06AA-4903-A6AE-95D358994F8F}"/>
               </a:ext>
             </a:extLst>
           </p:cNvPr>
@@ -3652,7 +3653,7 @@
           <p:cNvPr id="3" name="Picture Placeholder 2">
             <a:extLst>
               <a:ext uri="{FF2B5EF4-FFF2-40B4-BE49-F238E27FC236}">
-                <a16:creationId xmlns:a16="http://schemas.microsoft.com/office/drawing/2014/main" id="{9B3BE744-9C94-420B-A73E-E2A55803AB4E}"/>
+                <a16:creationId xmlns:a16="http://schemas.microsoft.com/office/drawing/2014/main" xmlns="" id="{9B3BE744-9C94-420B-A73E-E2A55803AB4E}"/>
               </a:ext>
             </a:extLst>
           </p:cNvPr>
@@ -3719,7 +3720,7 @@
           <p:cNvPr id="4" name="Text Placeholder 3">
             <a:extLst>
               <a:ext uri="{FF2B5EF4-FFF2-40B4-BE49-F238E27FC236}">
-                <a16:creationId xmlns:a16="http://schemas.microsoft.com/office/drawing/2014/main" id="{06165E76-0F7A-4421-913E-22DBBF249564}"/>
+                <a16:creationId xmlns:a16="http://schemas.microsoft.com/office/drawing/2014/main" xmlns="" id="{06165E76-0F7A-4421-913E-22DBBF249564}"/>
               </a:ext>
             </a:extLst>
           </p:cNvPr>
@@ -3790,7 +3791,7 @@
           <p:cNvPr id="5" name="Date Placeholder 4">
             <a:extLst>
               <a:ext uri="{FF2B5EF4-FFF2-40B4-BE49-F238E27FC236}">
-                <a16:creationId xmlns:a16="http://schemas.microsoft.com/office/drawing/2014/main" id="{E7FECE40-FA71-481A-9A45-996363BDEA3F}"/>
+                <a16:creationId xmlns:a16="http://schemas.microsoft.com/office/drawing/2014/main" xmlns="" id="{E7FECE40-FA71-481A-9A45-996363BDEA3F}"/>
               </a:ext>
             </a:extLst>
           </p:cNvPr>
@@ -3808,7 +3809,7 @@
           <a:p>
             <a:fld id="{589AE16E-CEA6-4880-98FC-41DF3E6D087C}" type="datetime1">
               <a:rPr lang="en-US" smtClean="0"/>
-              <a:t>15-Apr-19</a:t>
+              <a:t>17-Apr-19</a:t>
             </a:fld>
             <a:endParaRPr lang="en-US"/>
           </a:p>
@@ -3819,7 +3820,7 @@
           <p:cNvPr id="6" name="Footer Placeholder 5">
             <a:extLst>
               <a:ext uri="{FF2B5EF4-FFF2-40B4-BE49-F238E27FC236}">
-                <a16:creationId xmlns:a16="http://schemas.microsoft.com/office/drawing/2014/main" id="{857BC5EA-47CA-460B-A402-525892321E1F}"/>
+                <a16:creationId xmlns:a16="http://schemas.microsoft.com/office/drawing/2014/main" xmlns="" id="{857BC5EA-47CA-460B-A402-525892321E1F}"/>
               </a:ext>
             </a:extLst>
           </p:cNvPr>
@@ -3844,7 +3845,7 @@
           <p:cNvPr id="7" name="Slide Number Placeholder 6">
             <a:extLst>
               <a:ext uri="{FF2B5EF4-FFF2-40B4-BE49-F238E27FC236}">
-                <a16:creationId xmlns:a16="http://schemas.microsoft.com/office/drawing/2014/main" id="{1627B7D1-271B-43F5-8A77-1892612A5B90}"/>
+                <a16:creationId xmlns:a16="http://schemas.microsoft.com/office/drawing/2014/main" xmlns="" id="{1627B7D1-271B-43F5-8A77-1892612A5B90}"/>
               </a:ext>
             </a:extLst>
           </p:cNvPr>
@@ -3908,7 +3909,7 @@
           <p:cNvPr id="2" name="Title Placeholder 1">
             <a:extLst>
               <a:ext uri="{FF2B5EF4-FFF2-40B4-BE49-F238E27FC236}">
-                <a16:creationId xmlns:a16="http://schemas.microsoft.com/office/drawing/2014/main" id="{8801D740-5EBB-4FF5-AC01-071B60CE28A7}"/>
+                <a16:creationId xmlns:a16="http://schemas.microsoft.com/office/drawing/2014/main" xmlns="" id="{8801D740-5EBB-4FF5-AC01-071B60CE28A7}"/>
               </a:ext>
             </a:extLst>
           </p:cNvPr>
@@ -3946,7 +3947,7 @@
           <p:cNvPr id="3" name="Text Placeholder 2">
             <a:extLst>
               <a:ext uri="{FF2B5EF4-FFF2-40B4-BE49-F238E27FC236}">
-                <a16:creationId xmlns:a16="http://schemas.microsoft.com/office/drawing/2014/main" id="{1A210055-6C08-4AB1-AD20-550332477B3D}"/>
+                <a16:creationId xmlns:a16="http://schemas.microsoft.com/office/drawing/2014/main" xmlns="" id="{1A210055-6C08-4AB1-AD20-550332477B3D}"/>
               </a:ext>
             </a:extLst>
           </p:cNvPr>
@@ -4013,7 +4014,7 @@
           <p:cNvPr id="4" name="Date Placeholder 3">
             <a:extLst>
               <a:ext uri="{FF2B5EF4-FFF2-40B4-BE49-F238E27FC236}">
-                <a16:creationId xmlns:a16="http://schemas.microsoft.com/office/drawing/2014/main" id="{CF258083-5884-4C0D-A48B-C43204A1C20F}"/>
+                <a16:creationId xmlns:a16="http://schemas.microsoft.com/office/drawing/2014/main" xmlns="" id="{CF258083-5884-4C0D-A48B-C43204A1C20F}"/>
               </a:ext>
             </a:extLst>
           </p:cNvPr>
@@ -4049,7 +4050,7 @@
           <a:p>
             <a:fld id="{5E4AA930-1633-4B5E-A1AA-84473A42E1FC}" type="datetime1">
               <a:rPr lang="en-US" smtClean="0"/>
-              <a:t>15-Apr-19</a:t>
+              <a:t>17-Apr-19</a:t>
             </a:fld>
             <a:endParaRPr lang="en-US"/>
           </a:p>
@@ -4060,7 +4061,7 @@
           <p:cNvPr id="5" name="Footer Placeholder 4">
             <a:extLst>
               <a:ext uri="{FF2B5EF4-FFF2-40B4-BE49-F238E27FC236}">
-                <a16:creationId xmlns:a16="http://schemas.microsoft.com/office/drawing/2014/main" id="{BA5B66FB-90B5-43D4-81FA-B2D126843AF3}"/>
+                <a16:creationId xmlns:a16="http://schemas.microsoft.com/office/drawing/2014/main" xmlns="" id="{BA5B66FB-90B5-43D4-81FA-B2D126843AF3}"/>
               </a:ext>
             </a:extLst>
           </p:cNvPr>
@@ -4103,7 +4104,7 @@
           <p:cNvPr id="6" name="Slide Number Placeholder 5">
             <a:extLst>
               <a:ext uri="{FF2B5EF4-FFF2-40B4-BE49-F238E27FC236}">
-                <a16:creationId xmlns:a16="http://schemas.microsoft.com/office/drawing/2014/main" id="{A9346C58-D77B-4AA7-BA75-BC10ACABC6D8}"/>
+                <a16:creationId xmlns:a16="http://schemas.microsoft.com/office/drawing/2014/main" xmlns="" id="{A9346C58-D77B-4AA7-BA75-BC10ACABC6D8}"/>
               </a:ext>
             </a:extLst>
           </p:cNvPr>
@@ -4472,7 +4473,7 @@
           <p:cNvPr id="2" name="Title 1">
             <a:extLst>
               <a:ext uri="{FF2B5EF4-FFF2-40B4-BE49-F238E27FC236}">
-                <a16:creationId xmlns:a16="http://schemas.microsoft.com/office/drawing/2014/main" id="{0478C94B-560B-4641-9A65-E84C0A7FC43E}"/>
+                <a16:creationId xmlns:a16="http://schemas.microsoft.com/office/drawing/2014/main" xmlns="" id="{0478C94B-560B-4641-9A65-E84C0A7FC43E}"/>
               </a:ext>
             </a:extLst>
           </p:cNvPr>
@@ -4500,7 +4501,7 @@
           <p:cNvPr id="3" name="Subtitle 2">
             <a:extLst>
               <a:ext uri="{FF2B5EF4-FFF2-40B4-BE49-F238E27FC236}">
-                <a16:creationId xmlns:a16="http://schemas.microsoft.com/office/drawing/2014/main" id="{CF659FC7-0204-4355-82BB-4A9FD6619539}"/>
+                <a16:creationId xmlns:a16="http://schemas.microsoft.com/office/drawing/2014/main" xmlns="" id="{CF659FC7-0204-4355-82BB-4A9FD6619539}"/>
               </a:ext>
             </a:extLst>
           </p:cNvPr>
@@ -4534,7 +4535,7 @@
           <p:cNvPr id="4" name="Slide Number Placeholder 3">
             <a:extLst>
               <a:ext uri="{FF2B5EF4-FFF2-40B4-BE49-F238E27FC236}">
-                <a16:creationId xmlns:a16="http://schemas.microsoft.com/office/drawing/2014/main" id="{CCE2DF18-0D11-4548-A8A6-CC9519F0ECD8}"/>
+                <a16:creationId xmlns:a16="http://schemas.microsoft.com/office/drawing/2014/main" xmlns="" id="{CCE2DF18-0D11-4548-A8A6-CC9519F0ECD8}"/>
               </a:ext>
             </a:extLst>
           </p:cNvPr>
@@ -4593,7 +4594,7 @@
           <p:cNvPr id="2" name="Title 1">
             <a:extLst>
               <a:ext uri="{FF2B5EF4-FFF2-40B4-BE49-F238E27FC236}">
-                <a16:creationId xmlns:a16="http://schemas.microsoft.com/office/drawing/2014/main" id="{E37B757C-DE16-44B2-9F83-92C7752BB4F1}"/>
+                <a16:creationId xmlns:a16="http://schemas.microsoft.com/office/drawing/2014/main" xmlns="" id="{C09FFA69-F9C1-46C2-8AC3-FA9CB67DBC59}"/>
               </a:ext>
             </a:extLst>
           </p:cNvPr>
@@ -4611,7 +4612,7 @@
           <a:p>
             <a:r>
               <a:rPr lang="en-US" dirty="0"/>
-              <a:t>Computer Simulation Results – Forward Optimization Plan #1</a:t>
+              <a:t>Computer Simulation Results – Lessons Learned #2</a:t>
             </a:r>
           </a:p>
         </p:txBody>
@@ -4621,7 +4622,7 @@
           <p:cNvPr id="3" name="Content Placeholder 2">
             <a:extLst>
               <a:ext uri="{FF2B5EF4-FFF2-40B4-BE49-F238E27FC236}">
-                <a16:creationId xmlns:a16="http://schemas.microsoft.com/office/drawing/2014/main" id="{B5DF2F9E-BCEC-490B-BE17-282249AFECCB}"/>
+                <a16:creationId xmlns:a16="http://schemas.microsoft.com/office/drawing/2014/main" xmlns="" id="{DFDFB04B-34EE-42BB-AF8A-799C97D4AE57}"/>
               </a:ext>
             </a:extLst>
           </p:cNvPr>
@@ -4634,20 +4635,28 @@
         </p:nvSpPr>
         <p:spPr/>
         <p:txBody>
-          <a:bodyPr/>
+          <a:bodyPr>
+            <a:normAutofit/>
+          </a:bodyPr>
           <a:lstStyle/>
           <a:p>
             <a:r>
               <a:rPr lang="en-US" dirty="0"/>
-              <a:t>While performing a planned maneuvering scheme, the platoon can wind up getting closer to another R2D2, since the full sequence of steps involved in the maneuvering scheme is played out before analyzing the sensor again (sensor is already being measured every loop regardless of routine maneuvering or R2D2 avoidance).   It is theorized that this can be performed by running a change in state matrix showing which areas of the heatmap have changed the most since last time tick, and give attention to that WHILE maneuvering instead of blindly maneuvering a set directive for </a:t>
-            </a:r>
-            <a:r>
-              <a:rPr lang="en-US" i="1" dirty="0"/>
-              <a:t>n</a:t>
-            </a:r>
+              <a:t>Computer code must be kept maintainable so that programmers can add functionality without adding to the complexity too quickly.  Use objects/structures where possible, and if anything is repeated, generalize it in a function.</a:t>
+            </a:r>
+          </a:p>
+          <a:p>
             <a:r>
               <a:rPr lang="en-US" dirty="0"/>
-              <a:t> steps.</a:t>
+              <a:t>While open source software such as Octave is an extremely appreciated tool, it does not quite match up to </a:t>
+            </a:r>
+            <a:r>
+              <a:rPr lang="en-US" dirty="0" err="1"/>
+              <a:t>Matlab’s</a:t>
+            </a:r>
+            <a:r>
+              <a:rPr lang="en-US" dirty="0"/>
+              <a:t> robustness in terms of debugging and overall IDE quality.  Tried Octave on both Linux Mint and Windows 10, same issues but overall it works.</a:t>
             </a:r>
           </a:p>
         </p:txBody>
@@ -4657,7 +4666,7 @@
           <p:cNvPr id="4" name="Slide Number Placeholder 3">
             <a:extLst>
               <a:ext uri="{FF2B5EF4-FFF2-40B4-BE49-F238E27FC236}">
-                <a16:creationId xmlns:a16="http://schemas.microsoft.com/office/drawing/2014/main" id="{7D24A73C-9500-4EDE-AB81-936B12D51E9D}"/>
+                <a16:creationId xmlns:a16="http://schemas.microsoft.com/office/drawing/2014/main" xmlns="" id="{1E1C04A7-29B1-4850-B813-90C772E795DB}"/>
               </a:ext>
             </a:extLst>
           </p:cNvPr>
@@ -4684,7 +4693,7 @@
     </p:spTree>
     <p:extLst>
       <p:ext uri="{BB962C8B-B14F-4D97-AF65-F5344CB8AC3E}">
-        <p14:creationId xmlns:p14="http://schemas.microsoft.com/office/powerpoint/2010/main" val="2137785096"/>
+        <p14:creationId xmlns:p14="http://schemas.microsoft.com/office/powerpoint/2010/main" val="133390856"/>
       </p:ext>
     </p:extLst>
   </p:cSld>
@@ -4716,7 +4725,7 @@
           <p:cNvPr id="2" name="Title 1">
             <a:extLst>
               <a:ext uri="{FF2B5EF4-FFF2-40B4-BE49-F238E27FC236}">
-                <a16:creationId xmlns:a16="http://schemas.microsoft.com/office/drawing/2014/main" id="{F30745DC-5FB0-4DC2-85AA-6E667F43D883}"/>
+                <a16:creationId xmlns:a16="http://schemas.microsoft.com/office/drawing/2014/main" xmlns="" id="{E37B757C-DE16-44B2-9F83-92C7752BB4F1}"/>
               </a:ext>
             </a:extLst>
           </p:cNvPr>
@@ -4734,7 +4743,7 @@
           <a:p>
             <a:r>
               <a:rPr lang="en-US" dirty="0"/>
-              <a:t>Computer Simulation Results – Forward Optimization Plan #2</a:t>
+              <a:t>Computer Simulation Results – Forward Optimization Plan #1</a:t>
             </a:r>
           </a:p>
         </p:txBody>
@@ -4744,7 +4753,7 @@
           <p:cNvPr id="3" name="Content Placeholder 2">
             <a:extLst>
               <a:ext uri="{FF2B5EF4-FFF2-40B4-BE49-F238E27FC236}">
-                <a16:creationId xmlns:a16="http://schemas.microsoft.com/office/drawing/2014/main" id="{0372B9E9-7F9B-43B7-8269-F50984F3E779}"/>
+                <a16:creationId xmlns:a16="http://schemas.microsoft.com/office/drawing/2014/main" xmlns="" id="{B5DF2F9E-BCEC-490B-BE17-282249AFECCB}"/>
               </a:ext>
             </a:extLst>
           </p:cNvPr>
@@ -4762,13 +4771,15 @@
           <a:p>
             <a:r>
               <a:rPr lang="en-US" dirty="0"/>
-              <a:t>Although it is listed in the flowchart, I need to write the code to optimize the best path to the finish line (calculate slope from current coordinates).  Currently the code runs in a constant NE direction. When X or Y is saturated at GRID_SIZE, Y or X will just increment to GRID_SIZE.</a:t>
-            </a:r>
-          </a:p>
-          <a:p>
+              <a:t>While performing a planned maneuvering scheme, the platoon can wind up getting closer to another R2D2, since the full sequence of steps involved in the maneuvering scheme is played out before analyzing the sensor again (sensor is already being measured every loop regardless of routine maneuvering or R2D2 avoidance).   It is theorized that this can be performed by running a change in state matrix showing which areas of the heatmap have changed the most since last time tick, and give attention to that WHILE maneuvering instead of blindly maneuvering a set directive for </a:t>
+            </a:r>
+            <a:r>
+              <a:rPr lang="en-US" i="1" dirty="0"/>
+              <a:t>n</a:t>
+            </a:r>
             <a:r>
               <a:rPr lang="en-US" dirty="0"/>
-              <a:t>Another facet to be considered is that R2D2s near the finish line may make (1000,1000) unsafe, so the finish line may need to be modified during runtime.</a:t>
+              <a:t> steps.</a:t>
             </a:r>
           </a:p>
         </p:txBody>
@@ -4778,7 +4789,7 @@
           <p:cNvPr id="4" name="Slide Number Placeholder 3">
             <a:extLst>
               <a:ext uri="{FF2B5EF4-FFF2-40B4-BE49-F238E27FC236}">
-                <a16:creationId xmlns:a16="http://schemas.microsoft.com/office/drawing/2014/main" id="{BC87B9BE-49FA-4D8D-A9D6-2686085C10CC}"/>
+                <a16:creationId xmlns:a16="http://schemas.microsoft.com/office/drawing/2014/main" xmlns="" id="{7D24A73C-9500-4EDE-AB81-936B12D51E9D}"/>
               </a:ext>
             </a:extLst>
           </p:cNvPr>
@@ -4805,7 +4816,7 @@
     </p:spTree>
     <p:extLst>
       <p:ext uri="{BB962C8B-B14F-4D97-AF65-F5344CB8AC3E}">
-        <p14:creationId xmlns:p14="http://schemas.microsoft.com/office/powerpoint/2010/main" val="1038148999"/>
+        <p14:creationId xmlns:p14="http://schemas.microsoft.com/office/powerpoint/2010/main" val="2137785096"/>
       </p:ext>
     </p:extLst>
   </p:cSld>
@@ -4837,7 +4848,7 @@
           <p:cNvPr id="2" name="Title 1">
             <a:extLst>
               <a:ext uri="{FF2B5EF4-FFF2-40B4-BE49-F238E27FC236}">
-                <a16:creationId xmlns:a16="http://schemas.microsoft.com/office/drawing/2014/main" id="{462489B7-4307-403F-B474-D5DB3B87C1B1}"/>
+                <a16:creationId xmlns:a16="http://schemas.microsoft.com/office/drawing/2014/main" xmlns="" id="{F30745DC-5FB0-4DC2-85AA-6E667F43D883}"/>
               </a:ext>
             </a:extLst>
           </p:cNvPr>
@@ -4855,7 +4866,7 @@
           <a:p>
             <a:r>
               <a:rPr lang="en-US" dirty="0"/>
-              <a:t>Computer Simulation Results – Forward Optimization Plan #3</a:t>
+              <a:t>Computer Simulation Results – Forward Optimization Plan #2</a:t>
             </a:r>
           </a:p>
         </p:txBody>
@@ -4865,7 +4876,7 @@
           <p:cNvPr id="3" name="Content Placeholder 2">
             <a:extLst>
               <a:ext uri="{FF2B5EF4-FFF2-40B4-BE49-F238E27FC236}">
-                <a16:creationId xmlns:a16="http://schemas.microsoft.com/office/drawing/2014/main" id="{D488B721-101A-4196-B63B-FB6078C5A84B}"/>
+                <a16:creationId xmlns:a16="http://schemas.microsoft.com/office/drawing/2014/main" xmlns="" id="{0372B9E9-7F9B-43B7-8269-F50984F3E779}"/>
               </a:ext>
             </a:extLst>
           </p:cNvPr>
@@ -4883,21 +4894,13 @@
           <a:p>
             <a:r>
               <a:rPr lang="en-US" dirty="0"/>
-              <a:t>The sensor heatmap processing will require trial and error work and modifications.</a:t>
+              <a:t>Although it is listed in the flowchart, I need to write the code to optimize the best path to the finish line (calculate slope from current coordinates).  Currently the code runs in a constant NE direction. When X or Y is saturated at GRID_SIZE, Y or X will just increment to GRID_SIZE.</a:t>
             </a:r>
           </a:p>
           <a:p>
             <a:r>
               <a:rPr lang="en-US" dirty="0"/>
-              <a:t>The platoon always picks South x steps followed by East y steps, since it is naturally moving NE, and the way the algorithm currently stands, x and y offsets are calculated and at the quadrant (+</a:t>
-            </a:r>
-            <a:r>
-              <a:rPr lang="en-US" dirty="0" err="1"/>
-              <a:t>x,+y</a:t>
-            </a:r>
-            <a:r>
-              <a:rPr lang="en-US" dirty="0"/>
-              <a:t>) there exists the greatest value on the heatmap.</a:t>
+              <a:t>Another facet to be considered is that R2D2s near the finish line may make (1000,1000) unsafe, so the finish line may need to be modified during runtime.</a:t>
             </a:r>
           </a:p>
         </p:txBody>
@@ -4907,7 +4910,7 @@
           <p:cNvPr id="4" name="Slide Number Placeholder 3">
             <a:extLst>
               <a:ext uri="{FF2B5EF4-FFF2-40B4-BE49-F238E27FC236}">
-                <a16:creationId xmlns:a16="http://schemas.microsoft.com/office/drawing/2014/main" id="{96FBB39F-B054-415C-8352-C2C15617ED20}"/>
+                <a16:creationId xmlns:a16="http://schemas.microsoft.com/office/drawing/2014/main" xmlns="" id="{BC87B9BE-49FA-4D8D-A9D6-2686085C10CC}"/>
               </a:ext>
             </a:extLst>
           </p:cNvPr>
@@ -4934,7 +4937,7 @@
     </p:spTree>
     <p:extLst>
       <p:ext uri="{BB962C8B-B14F-4D97-AF65-F5344CB8AC3E}">
-        <p14:creationId xmlns:p14="http://schemas.microsoft.com/office/powerpoint/2010/main" val="4121416747"/>
+        <p14:creationId xmlns:p14="http://schemas.microsoft.com/office/powerpoint/2010/main" val="1038148999"/>
       </p:ext>
     </p:extLst>
   </p:cSld>
@@ -4966,7 +4969,7 @@
           <p:cNvPr id="2" name="Title 1">
             <a:extLst>
               <a:ext uri="{FF2B5EF4-FFF2-40B4-BE49-F238E27FC236}">
-                <a16:creationId xmlns:a16="http://schemas.microsoft.com/office/drawing/2014/main" id="{5CF00720-A1CA-46C1-9C32-A21BD48ECD63}"/>
+                <a16:creationId xmlns:a16="http://schemas.microsoft.com/office/drawing/2014/main" xmlns="" id="{462489B7-4307-403F-B474-D5DB3B87C1B1}"/>
               </a:ext>
             </a:extLst>
           </p:cNvPr>
@@ -4984,7 +4987,7 @@
           <a:p>
             <a:r>
               <a:rPr lang="en-US" dirty="0"/>
-              <a:t>Conclusions for End User</a:t>
+              <a:t>Computer Simulation Results – Forward Optimization Plan #3</a:t>
             </a:r>
           </a:p>
         </p:txBody>
@@ -4994,7 +4997,7 @@
           <p:cNvPr id="3" name="Content Placeholder 2">
             <a:extLst>
               <a:ext uri="{FF2B5EF4-FFF2-40B4-BE49-F238E27FC236}">
-                <a16:creationId xmlns:a16="http://schemas.microsoft.com/office/drawing/2014/main" id="{1098751E-4ECF-4D37-BD4B-D126086843E7}"/>
+                <a16:creationId xmlns:a16="http://schemas.microsoft.com/office/drawing/2014/main" xmlns="" id="{D488B721-101A-4196-B63B-FB6078C5A84B}"/>
               </a:ext>
             </a:extLst>
           </p:cNvPr>
@@ -5012,13 +5015,21 @@
           <a:p>
             <a:r>
               <a:rPr lang="en-US" dirty="0"/>
-              <a:t>Computer simulation of a real-world problem is helpful because it disciplines the objectives of the problem statement.</a:t>
+              <a:t>The sensor heatmap processing will require trial and error work and modifications.</a:t>
             </a:r>
           </a:p>
           <a:p>
             <a:r>
               <a:rPr lang="en-US" dirty="0"/>
-              <a:t>Besides a nice simulation output, the problem statement gets defined more and the development team can produce a better product in the end.</a:t>
+              <a:t>The platoon always picks South x steps followed by East y steps, since it is naturally moving NE, and the way the algorithm currently stands, x and y offsets are calculated and at the quadrant (+</a:t>
+            </a:r>
+            <a:r>
+              <a:rPr lang="en-US" dirty="0" err="1"/>
+              <a:t>x,+y</a:t>
+            </a:r>
+            <a:r>
+              <a:rPr lang="en-US" dirty="0"/>
+              <a:t>) there exists the greatest value on the heatmap.</a:t>
             </a:r>
           </a:p>
         </p:txBody>
@@ -5028,7 +5039,7 @@
           <p:cNvPr id="4" name="Slide Number Placeholder 3">
             <a:extLst>
               <a:ext uri="{FF2B5EF4-FFF2-40B4-BE49-F238E27FC236}">
-                <a16:creationId xmlns:a16="http://schemas.microsoft.com/office/drawing/2014/main" id="{B8A1BA13-3DFA-411B-98F2-18E045F4200B}"/>
+                <a16:creationId xmlns:a16="http://schemas.microsoft.com/office/drawing/2014/main" xmlns="" id="{96FBB39F-B054-415C-8352-C2C15617ED20}"/>
               </a:ext>
             </a:extLst>
           </p:cNvPr>
@@ -5048,6 +5059,127 @@
               <a:rPr lang="en-US" smtClean="0"/>
               <a:t>13</a:t>
             </a:fld>
+            <a:endParaRPr lang="en-US"/>
+          </a:p>
+        </p:txBody>
+      </p:sp>
+    </p:spTree>
+    <p:extLst>
+      <p:ext uri="{BB962C8B-B14F-4D97-AF65-F5344CB8AC3E}">
+        <p14:creationId xmlns:p14="http://schemas.microsoft.com/office/powerpoint/2010/main" val="4121416747"/>
+      </p:ext>
+    </p:extLst>
+  </p:cSld>
+  <p:clrMapOvr>
+    <a:masterClrMapping/>
+  </p:clrMapOvr>
+</p:sld>
+</file>
+
+<file path=ppt/slides/slide14.xml><?xml version="1.0" encoding="utf-8"?>
+<p:sld xmlns:a="http://schemas.openxmlformats.org/drawingml/2006/main" xmlns:r="http://schemas.openxmlformats.org/officeDocument/2006/relationships" xmlns:p="http://schemas.openxmlformats.org/presentationml/2006/main">
+  <p:cSld>
+    <p:spTree>
+      <p:nvGrpSpPr>
+        <p:cNvPr id="1" name=""/>
+        <p:cNvGrpSpPr/>
+        <p:nvPr/>
+      </p:nvGrpSpPr>
+      <p:grpSpPr>
+        <a:xfrm>
+          <a:off x="0" y="0"/>
+          <a:ext cx="0" cy="0"/>
+          <a:chOff x="0" y="0"/>
+          <a:chExt cx="0" cy="0"/>
+        </a:xfrm>
+      </p:grpSpPr>
+      <p:sp>
+        <p:nvSpPr>
+          <p:cNvPr id="2" name="Title 1">
+            <a:extLst>
+              <a:ext uri="{FF2B5EF4-FFF2-40B4-BE49-F238E27FC236}">
+                <a16:creationId xmlns:a16="http://schemas.microsoft.com/office/drawing/2014/main" xmlns="" id="{5CF00720-A1CA-46C1-9C32-A21BD48ECD63}"/>
+              </a:ext>
+            </a:extLst>
+          </p:cNvPr>
+          <p:cNvSpPr>
+            <a:spLocks noGrp="1"/>
+          </p:cNvSpPr>
+          <p:nvPr>
+            <p:ph type="title"/>
+          </p:nvPr>
+        </p:nvSpPr>
+        <p:spPr/>
+        <p:txBody>
+          <a:bodyPr/>
+          <a:lstStyle/>
+          <a:p>
+            <a:r>
+              <a:rPr lang="en-US" dirty="0"/>
+              <a:t>Conclusions for End User</a:t>
+            </a:r>
+          </a:p>
+        </p:txBody>
+      </p:sp>
+      <p:sp>
+        <p:nvSpPr>
+          <p:cNvPr id="3" name="Content Placeholder 2">
+            <a:extLst>
+              <a:ext uri="{FF2B5EF4-FFF2-40B4-BE49-F238E27FC236}">
+                <a16:creationId xmlns:a16="http://schemas.microsoft.com/office/drawing/2014/main" xmlns="" id="{1098751E-4ECF-4D37-BD4B-D126086843E7}"/>
+              </a:ext>
+            </a:extLst>
+          </p:cNvPr>
+          <p:cNvSpPr>
+            <a:spLocks noGrp="1"/>
+          </p:cNvSpPr>
+          <p:nvPr>
+            <p:ph idx="1"/>
+          </p:nvPr>
+        </p:nvSpPr>
+        <p:spPr/>
+        <p:txBody>
+          <a:bodyPr/>
+          <a:lstStyle/>
+          <a:p>
+            <a:r>
+              <a:rPr lang="en-US" dirty="0"/>
+              <a:t>Computer simulation of a real-world problem is helpful because it disciplines the objectives of the problem statement.</a:t>
+            </a:r>
+          </a:p>
+          <a:p>
+            <a:r>
+              <a:rPr lang="en-US" dirty="0"/>
+              <a:t>Besides a nice simulation output, the problem statement gets defined more and the development team can produce a better product in the end.</a:t>
+            </a:r>
+          </a:p>
+        </p:txBody>
+      </p:sp>
+      <p:sp>
+        <p:nvSpPr>
+          <p:cNvPr id="4" name="Slide Number Placeholder 3">
+            <a:extLst>
+              <a:ext uri="{FF2B5EF4-FFF2-40B4-BE49-F238E27FC236}">
+                <a16:creationId xmlns:a16="http://schemas.microsoft.com/office/drawing/2014/main" xmlns="" id="{B8A1BA13-3DFA-411B-98F2-18E045F4200B}"/>
+              </a:ext>
+            </a:extLst>
+          </p:cNvPr>
+          <p:cNvSpPr>
+            <a:spLocks noGrp="1"/>
+          </p:cNvSpPr>
+          <p:nvPr>
+            <p:ph type="sldNum" sz="quarter" idx="12"/>
+          </p:nvPr>
+        </p:nvSpPr>
+        <p:spPr/>
+        <p:txBody>
+          <a:bodyPr/>
+          <a:lstStyle/>
+          <a:p>
+            <a:fld id="{E9CEDB86-3240-4235-A507-295BD99BE75C}" type="slidenum">
+              <a:rPr lang="en-US" smtClean="0"/>
+              <a:t>14</a:t>
+            </a:fld>
             <a:endParaRPr lang="en-US" dirty="0"/>
           </a:p>
         </p:txBody>
@@ -5057,7 +5189,7 @@
           <p:cNvPr id="18" name="Straight Arrow Connector 17">
             <a:extLst>
               <a:ext uri="{FF2B5EF4-FFF2-40B4-BE49-F238E27FC236}">
-                <a16:creationId xmlns:a16="http://schemas.microsoft.com/office/drawing/2014/main" id="{5812442D-2C1F-4E3D-A8D4-1463BEA57A38}"/>
+                <a16:creationId xmlns:a16="http://schemas.microsoft.com/office/drawing/2014/main" xmlns="" id="{5812442D-2C1F-4E3D-A8D4-1463BEA57A38}"/>
               </a:ext>
             </a:extLst>
           </p:cNvPr>
@@ -5099,7 +5231,7 @@
           <p:cNvPr id="26" name="Straight Arrow Connector 25">
             <a:extLst>
               <a:ext uri="{FF2B5EF4-FFF2-40B4-BE49-F238E27FC236}">
-                <a16:creationId xmlns:a16="http://schemas.microsoft.com/office/drawing/2014/main" id="{D2D56F59-5788-4E37-A886-B2EE53E3D807}"/>
+                <a16:creationId xmlns:a16="http://schemas.microsoft.com/office/drawing/2014/main" xmlns="" id="{D2D56F59-5788-4E37-A886-B2EE53E3D807}"/>
               </a:ext>
             </a:extLst>
           </p:cNvPr>
@@ -5141,7 +5273,7 @@
           <p:cNvPr id="12" name="Rectangle 11">
             <a:extLst>
               <a:ext uri="{FF2B5EF4-FFF2-40B4-BE49-F238E27FC236}">
-                <a16:creationId xmlns:a16="http://schemas.microsoft.com/office/drawing/2014/main" id="{D0F6F7A2-0FEE-4B26-8B3E-3E5F98ADB252}"/>
+                <a16:creationId xmlns:a16="http://schemas.microsoft.com/office/drawing/2014/main" xmlns="" id="{D0F6F7A2-0FEE-4B26-8B3E-3E5F98ADB252}"/>
               </a:ext>
             </a:extLst>
           </p:cNvPr>
@@ -5188,7 +5320,7 @@
           <p:cNvPr id="13" name="Rectangle 12">
             <a:extLst>
               <a:ext uri="{FF2B5EF4-FFF2-40B4-BE49-F238E27FC236}">
-                <a16:creationId xmlns:a16="http://schemas.microsoft.com/office/drawing/2014/main" id="{F0EBC74E-3350-41A1-8243-62974647F166}"/>
+                <a16:creationId xmlns:a16="http://schemas.microsoft.com/office/drawing/2014/main" xmlns="" id="{F0EBC74E-3350-41A1-8243-62974647F166}"/>
               </a:ext>
             </a:extLst>
           </p:cNvPr>
@@ -5235,7 +5367,7 @@
           <p:cNvPr id="16" name="Group 15">
             <a:extLst>
               <a:ext uri="{FF2B5EF4-FFF2-40B4-BE49-F238E27FC236}">
-                <a16:creationId xmlns:a16="http://schemas.microsoft.com/office/drawing/2014/main" id="{EC71BFA6-5CC4-4CEA-8DD8-197D5CE00B5B}"/>
+                <a16:creationId xmlns:a16="http://schemas.microsoft.com/office/drawing/2014/main" xmlns="" id="{EC71BFA6-5CC4-4CEA-8DD8-197D5CE00B5B}"/>
               </a:ext>
             </a:extLst>
           </p:cNvPr>
@@ -5255,7 +5387,7 @@
             <p:cNvPr id="11" name="Group 10">
               <a:extLst>
                 <a:ext uri="{FF2B5EF4-FFF2-40B4-BE49-F238E27FC236}">
-                  <a16:creationId xmlns:a16="http://schemas.microsoft.com/office/drawing/2014/main" id="{E680F06E-2017-400B-A468-FE874CECED43}"/>
+                  <a16:creationId xmlns:a16="http://schemas.microsoft.com/office/drawing/2014/main" xmlns="" id="{E680F06E-2017-400B-A468-FE874CECED43}"/>
                 </a:ext>
               </a:extLst>
             </p:cNvPr>
@@ -5275,7 +5407,7 @@
               <p:cNvPr id="6" name="Oval 5">
                 <a:extLst>
                   <a:ext uri="{FF2B5EF4-FFF2-40B4-BE49-F238E27FC236}">
-                    <a16:creationId xmlns:a16="http://schemas.microsoft.com/office/drawing/2014/main" id="{C9402476-E4BC-47F0-AD31-4E4EC414B2A5}"/>
+                    <a16:creationId xmlns:a16="http://schemas.microsoft.com/office/drawing/2014/main" xmlns="" id="{C9402476-E4BC-47F0-AD31-4E4EC414B2A5}"/>
                   </a:ext>
                 </a:extLst>
               </p:cNvPr>
@@ -5319,7 +5451,7 @@
               <p:cNvPr id="8" name="Straight Connector 7">
                 <a:extLst>
                   <a:ext uri="{FF2B5EF4-FFF2-40B4-BE49-F238E27FC236}">
-                    <a16:creationId xmlns:a16="http://schemas.microsoft.com/office/drawing/2014/main" id="{F2D2C524-4FC3-4E44-9B0E-03F4762ED1F2}"/>
+                    <a16:creationId xmlns:a16="http://schemas.microsoft.com/office/drawing/2014/main" xmlns="" id="{F2D2C524-4FC3-4E44-9B0E-03F4762ED1F2}"/>
                   </a:ext>
                 </a:extLst>
               </p:cNvPr>
@@ -5358,7 +5490,7 @@
               <p:cNvPr id="10" name="Straight Connector 9">
                 <a:extLst>
                   <a:ext uri="{FF2B5EF4-FFF2-40B4-BE49-F238E27FC236}">
-                    <a16:creationId xmlns:a16="http://schemas.microsoft.com/office/drawing/2014/main" id="{7E8ED775-409B-4A07-81CC-B02DCBE9FEFB}"/>
+                    <a16:creationId xmlns:a16="http://schemas.microsoft.com/office/drawing/2014/main" xmlns="" id="{7E8ED775-409B-4A07-81CC-B02DCBE9FEFB}"/>
                   </a:ext>
                 </a:extLst>
               </p:cNvPr>
@@ -5398,7 +5530,7 @@
             <p:cNvPr id="14" name="TextBox 13">
               <a:extLst>
                 <a:ext uri="{FF2B5EF4-FFF2-40B4-BE49-F238E27FC236}">
-                  <a16:creationId xmlns:a16="http://schemas.microsoft.com/office/drawing/2014/main" id="{19E2E65E-49B0-4CCA-B7E8-617BCF88D01D}"/>
+                  <a16:creationId xmlns:a16="http://schemas.microsoft.com/office/drawing/2014/main" xmlns="" id="{19E2E65E-49B0-4CCA-B7E8-617BCF88D01D}"/>
                 </a:ext>
               </a:extLst>
             </p:cNvPr>
@@ -5433,7 +5565,7 @@
             <p:cNvPr id="15" name="TextBox 14">
               <a:extLst>
                 <a:ext uri="{FF2B5EF4-FFF2-40B4-BE49-F238E27FC236}">
-                  <a16:creationId xmlns:a16="http://schemas.microsoft.com/office/drawing/2014/main" id="{B4F5F0F0-FEBC-447E-A339-19F0FEB4D32A}"/>
+                  <a16:creationId xmlns:a16="http://schemas.microsoft.com/office/drawing/2014/main" xmlns="" id="{B4F5F0F0-FEBC-447E-A339-19F0FEB4D32A}"/>
                 </a:ext>
               </a:extLst>
             </p:cNvPr>
@@ -5469,7 +5601,7 @@
           <p:cNvPr id="20" name="Straight Arrow Connector 19">
             <a:extLst>
               <a:ext uri="{FF2B5EF4-FFF2-40B4-BE49-F238E27FC236}">
-                <a16:creationId xmlns:a16="http://schemas.microsoft.com/office/drawing/2014/main" id="{3BC7D682-1A96-446F-9633-7B67F6E9D998}"/>
+                <a16:creationId xmlns:a16="http://schemas.microsoft.com/office/drawing/2014/main" xmlns="" id="{3BC7D682-1A96-446F-9633-7B67F6E9D998}"/>
               </a:ext>
             </a:extLst>
           </p:cNvPr>
@@ -5512,7 +5644,7 @@
           <p:cNvPr id="28" name="Connector: Elbow 27">
             <a:extLst>
               <a:ext uri="{FF2B5EF4-FFF2-40B4-BE49-F238E27FC236}">
-                <a16:creationId xmlns:a16="http://schemas.microsoft.com/office/drawing/2014/main" id="{1F7A13DE-DD97-4C56-90AC-9E1F89FC52FD}"/>
+                <a16:creationId xmlns:a16="http://schemas.microsoft.com/office/drawing/2014/main" xmlns="" id="{1F7A13DE-DD97-4C56-90AC-9E1F89FC52FD}"/>
               </a:ext>
             </a:extLst>
           </p:cNvPr>
@@ -5554,7 +5686,7 @@
           <p:cNvPr id="30" name="Connector: Elbow 29">
             <a:extLst>
               <a:ext uri="{FF2B5EF4-FFF2-40B4-BE49-F238E27FC236}">
-                <a16:creationId xmlns:a16="http://schemas.microsoft.com/office/drawing/2014/main" id="{B12CE030-CA95-4FE9-8E19-4D0D7F2FD0A3}"/>
+                <a16:creationId xmlns:a16="http://schemas.microsoft.com/office/drawing/2014/main" xmlns="" id="{B12CE030-CA95-4FE9-8E19-4D0D7F2FD0A3}"/>
               </a:ext>
             </a:extLst>
           </p:cNvPr>
@@ -5596,7 +5728,7 @@
           <p:cNvPr id="32" name="TextBox 31">
             <a:extLst>
               <a:ext uri="{FF2B5EF4-FFF2-40B4-BE49-F238E27FC236}">
-                <a16:creationId xmlns:a16="http://schemas.microsoft.com/office/drawing/2014/main" id="{190D3458-9156-4DA8-BF27-3DEFFBB3977D}"/>
+                <a16:creationId xmlns:a16="http://schemas.microsoft.com/office/drawing/2014/main" xmlns="" id="{190D3458-9156-4DA8-BF27-3DEFFBB3977D}"/>
               </a:ext>
             </a:extLst>
           </p:cNvPr>
@@ -5631,7 +5763,7 @@
           <p:cNvPr id="34" name="TextBox 33">
             <a:extLst>
               <a:ext uri="{FF2B5EF4-FFF2-40B4-BE49-F238E27FC236}">
-                <a16:creationId xmlns:a16="http://schemas.microsoft.com/office/drawing/2014/main" id="{05E6EAC8-6FFB-432B-9F9E-110E500EACE8}"/>
+                <a16:creationId xmlns:a16="http://schemas.microsoft.com/office/drawing/2014/main" xmlns="" id="{05E6EAC8-6FFB-432B-9F9E-110E500EACE8}"/>
               </a:ext>
             </a:extLst>
           </p:cNvPr>
@@ -5670,7 +5802,7 @@
           <p:cNvPr id="36" name="TextBox 35">
             <a:extLst>
               <a:ext uri="{FF2B5EF4-FFF2-40B4-BE49-F238E27FC236}">
-                <a16:creationId xmlns:a16="http://schemas.microsoft.com/office/drawing/2014/main" id="{5DB8E897-CAC4-425A-8184-3670610757D2}"/>
+                <a16:creationId xmlns:a16="http://schemas.microsoft.com/office/drawing/2014/main" xmlns="" id="{5DB8E897-CAC4-425A-8184-3670610757D2}"/>
               </a:ext>
             </a:extLst>
           </p:cNvPr>
@@ -5705,7 +5837,7 @@
           <p:cNvPr id="42" name="Rectangle 41">
             <a:extLst>
               <a:ext uri="{FF2B5EF4-FFF2-40B4-BE49-F238E27FC236}">
-                <a16:creationId xmlns:a16="http://schemas.microsoft.com/office/drawing/2014/main" id="{401B6F4A-B077-4D5B-B8A5-1D8743108BA8}"/>
+                <a16:creationId xmlns:a16="http://schemas.microsoft.com/office/drawing/2014/main" xmlns="" id="{401B6F4A-B077-4D5B-B8A5-1D8743108BA8}"/>
               </a:ext>
             </a:extLst>
           </p:cNvPr>
@@ -5752,7 +5884,7 @@
           <p:cNvPr id="44" name="Straight Arrow Connector 43">
             <a:extLst>
               <a:ext uri="{FF2B5EF4-FFF2-40B4-BE49-F238E27FC236}">
-                <a16:creationId xmlns:a16="http://schemas.microsoft.com/office/drawing/2014/main" id="{9633BB7D-AAFB-4FF0-A9E2-119B9E047243}"/>
+                <a16:creationId xmlns:a16="http://schemas.microsoft.com/office/drawing/2014/main" xmlns="" id="{9633BB7D-AAFB-4FF0-A9E2-119B9E047243}"/>
               </a:ext>
             </a:extLst>
           </p:cNvPr>
@@ -5795,7 +5927,7 @@
           <p:cNvPr id="47" name="TextBox 46">
             <a:extLst>
               <a:ext uri="{FF2B5EF4-FFF2-40B4-BE49-F238E27FC236}">
-                <a16:creationId xmlns:a16="http://schemas.microsoft.com/office/drawing/2014/main" id="{D6A1A500-D63A-4140-9AA9-DE1E5C6F32AB}"/>
+                <a16:creationId xmlns:a16="http://schemas.microsoft.com/office/drawing/2014/main" xmlns="" id="{D6A1A500-D63A-4140-9AA9-DE1E5C6F32AB}"/>
               </a:ext>
             </a:extLst>
           </p:cNvPr>
@@ -5860,7 +5992,7 @@
           <p:cNvPr id="2" name="Title 1">
             <a:extLst>
               <a:ext uri="{FF2B5EF4-FFF2-40B4-BE49-F238E27FC236}">
-                <a16:creationId xmlns:a16="http://schemas.microsoft.com/office/drawing/2014/main" id="{C3DDA624-F1E0-4E7C-90DE-5B3D8AE85BD5}"/>
+                <a16:creationId xmlns:a16="http://schemas.microsoft.com/office/drawing/2014/main" xmlns="" id="{C3DDA624-F1E0-4E7C-90DE-5B3D8AE85BD5}"/>
               </a:ext>
             </a:extLst>
           </p:cNvPr>
@@ -5888,7 +6020,7 @@
           <p:cNvPr id="3" name="Content Placeholder 2">
             <a:extLst>
               <a:ext uri="{FF2B5EF4-FFF2-40B4-BE49-F238E27FC236}">
-                <a16:creationId xmlns:a16="http://schemas.microsoft.com/office/drawing/2014/main" id="{7319CB44-C789-45A1-BEF8-8FF363AB4CFA}"/>
+                <a16:creationId xmlns:a16="http://schemas.microsoft.com/office/drawing/2014/main" xmlns="" id="{7319CB44-C789-45A1-BEF8-8FF363AB4CFA}"/>
               </a:ext>
             </a:extLst>
           </p:cNvPr>
@@ -5940,7 +6072,7 @@
           <p:cNvPr id="4" name="Slide Number Placeholder 3">
             <a:extLst>
               <a:ext uri="{FF2B5EF4-FFF2-40B4-BE49-F238E27FC236}">
-                <a16:creationId xmlns:a16="http://schemas.microsoft.com/office/drawing/2014/main" id="{FF8DD675-72C8-4174-A7B2-A094A583EA1F}"/>
+                <a16:creationId xmlns:a16="http://schemas.microsoft.com/office/drawing/2014/main" xmlns="" id="{FF8DD675-72C8-4174-A7B2-A094A583EA1F}"/>
               </a:ext>
             </a:extLst>
           </p:cNvPr>
@@ -5999,7 +6131,7 @@
           <p:cNvPr id="2" name="Title 1">
             <a:extLst>
               <a:ext uri="{FF2B5EF4-FFF2-40B4-BE49-F238E27FC236}">
-                <a16:creationId xmlns:a16="http://schemas.microsoft.com/office/drawing/2014/main" id="{E57C666E-2418-4998-9AC8-3D198425EF42}"/>
+                <a16:creationId xmlns:a16="http://schemas.microsoft.com/office/drawing/2014/main" xmlns="" id="{E57C666E-2418-4998-9AC8-3D198425EF42}"/>
               </a:ext>
             </a:extLst>
           </p:cNvPr>
@@ -6027,7 +6159,7 @@
           <p:cNvPr id="3" name="Content Placeholder 2">
             <a:extLst>
               <a:ext uri="{FF2B5EF4-FFF2-40B4-BE49-F238E27FC236}">
-                <a16:creationId xmlns:a16="http://schemas.microsoft.com/office/drawing/2014/main" id="{BCB0937F-899F-4B4F-BDC6-E9B4F1E1802C}"/>
+                <a16:creationId xmlns:a16="http://schemas.microsoft.com/office/drawing/2014/main" xmlns="" id="{BCB0937F-899F-4B4F-BDC6-E9B4F1E1802C}"/>
               </a:ext>
             </a:extLst>
           </p:cNvPr>
@@ -6041,7 +6173,7 @@
         <p:spPr/>
         <p:txBody>
           <a:bodyPr>
-            <a:normAutofit fontScale="92500" lnSpcReduction="20000"/>
+            <a:normAutofit fontScale="77500" lnSpcReduction="20000"/>
           </a:bodyPr>
           <a:lstStyle/>
           <a:p>
@@ -6126,8 +6258,35 @@
             <a:pPr lvl="2"/>
             <a:r>
               <a:rPr lang="en-US" dirty="0"/>
-              <a:t>MAX_RANGE: the maximum range at which the platoon can read an R2D2.</a:t>
-            </a:r>
+              <a:t>MAX_RANGE: the maximum range at which the platoon can read an R2D2</a:t>
+            </a:r>
+            <a:r>
+              <a:rPr lang="en-US" dirty="0" smtClean="0"/>
+              <a:t>.</a:t>
+            </a:r>
+          </a:p>
+          <a:p>
+            <a:pPr lvl="2"/>
+            <a:r>
+              <a:rPr lang="en-US" dirty="0" smtClean="0"/>
+              <a:t>These are inputted as a string, number pair into the run command in the Octave/</a:t>
+            </a:r>
+            <a:r>
+              <a:rPr lang="en-US" dirty="0" err="1" smtClean="0"/>
+              <a:t>Matlab</a:t>
+            </a:r>
+            <a:r>
+              <a:rPr lang="en-US" dirty="0" smtClean="0"/>
+              <a:t> console window:</a:t>
+            </a:r>
+          </a:p>
+          <a:p>
+            <a:pPr lvl="3"/>
+            <a:r>
+              <a:rPr lang="en-US" dirty="0" smtClean="0"/>
+              <a:t>E.g. r2d2_sim(‘GRID_SIZE’, 500);</a:t>
+            </a:r>
+            <a:endParaRPr lang="en-US" dirty="0"/>
           </a:p>
         </p:txBody>
       </p:sp>
@@ -6136,7 +6295,7 @@
           <p:cNvPr id="4" name="Slide Number Placeholder 3">
             <a:extLst>
               <a:ext uri="{FF2B5EF4-FFF2-40B4-BE49-F238E27FC236}">
-                <a16:creationId xmlns:a16="http://schemas.microsoft.com/office/drawing/2014/main" id="{FF69F6B7-12B9-4AFA-B338-C24C2181699F}"/>
+                <a16:creationId xmlns:a16="http://schemas.microsoft.com/office/drawing/2014/main" xmlns="" id="{FF69F6B7-12B9-4AFA-B338-C24C2181699F}"/>
               </a:ext>
             </a:extLst>
           </p:cNvPr>
@@ -6195,7 +6354,7 @@
           <p:cNvPr id="2" name="Title 1">
             <a:extLst>
               <a:ext uri="{FF2B5EF4-FFF2-40B4-BE49-F238E27FC236}">
-                <a16:creationId xmlns:a16="http://schemas.microsoft.com/office/drawing/2014/main" id="{2920E4B3-CDA2-4B45-BC00-1C9CDF2774D8}"/>
+                <a16:creationId xmlns:a16="http://schemas.microsoft.com/office/drawing/2014/main" xmlns="" id="{2920E4B3-CDA2-4B45-BC00-1C9CDF2774D8}"/>
               </a:ext>
             </a:extLst>
           </p:cNvPr>
@@ -6223,7 +6382,7 @@
           <p:cNvPr id="3" name="Content Placeholder 2">
             <a:extLst>
               <a:ext uri="{FF2B5EF4-FFF2-40B4-BE49-F238E27FC236}">
-                <a16:creationId xmlns:a16="http://schemas.microsoft.com/office/drawing/2014/main" id="{932B4E69-A5A7-412E-BDBC-A62143E73206}"/>
+                <a16:creationId xmlns:a16="http://schemas.microsoft.com/office/drawing/2014/main" xmlns="" id="{932B4E69-A5A7-412E-BDBC-A62143E73206}"/>
               </a:ext>
             </a:extLst>
           </p:cNvPr>
@@ -6236,7 +6395,9 @@
         </p:nvSpPr>
         <p:spPr/>
         <p:txBody>
-          <a:bodyPr/>
+          <a:bodyPr>
+            <a:normAutofit fontScale="92500"/>
+          </a:bodyPr>
           <a:lstStyle/>
           <a:p>
             <a:r>
@@ -6254,12 +6415,30 @@
           <a:p>
             <a:r>
               <a:rPr lang="en-US" dirty="0"/>
-              <a:t>The platoon sensor has a different reliability each time tick, governed by an RNG that sets a 0-1 scalar to be multiplied by the MAX_RANGE variable.</a:t>
-            </a:r>
-          </a:p>
-          <a:p>
+              <a:t>The platoon sensor has a different reliability each time tick, governed by an RNG that sets a 0-1 scalar to be multiplied by the MAX_RANGE variable</a:t>
+            </a:r>
+            <a:r>
+              <a:rPr lang="en-US" dirty="0" smtClean="0"/>
+              <a:t>.</a:t>
+            </a:r>
+          </a:p>
+          <a:p>
+            <a:r>
+              <a:rPr lang="en-US" dirty="0" smtClean="0"/>
+              <a:t>Optimizing the Platoon Maneuvering will be paramount to successfully getting the platoon safely to the finish mark.</a:t>
+            </a:r>
+          </a:p>
+          <a:p>
+            <a:pPr lvl="1"/>
+            <a:r>
+              <a:rPr lang="en-US" dirty="0" smtClean="0"/>
+              <a:t>Translation: The sensor analyzation techniques will also need optimized since the Platoon structure in the m-file uses the sensor structure to decide how to proceed.</a:t>
+            </a:r>
             <a:endParaRPr lang="en-US" dirty="0"/>
           </a:p>
+          <a:p>
+            <a:endParaRPr lang="en-US" dirty="0"/>
+          </a:p>
         </p:txBody>
       </p:sp>
       <p:sp>
@@ -6267,7 +6446,7 @@
           <p:cNvPr id="4" name="Slide Number Placeholder 3">
             <a:extLst>
               <a:ext uri="{FF2B5EF4-FFF2-40B4-BE49-F238E27FC236}">
-                <a16:creationId xmlns:a16="http://schemas.microsoft.com/office/drawing/2014/main" id="{1B3CF70C-B2CA-425A-B930-FE7136F8AB3D}"/>
+                <a16:creationId xmlns:a16="http://schemas.microsoft.com/office/drawing/2014/main" xmlns="" id="{1B3CF70C-B2CA-425A-B930-FE7136F8AB3D}"/>
               </a:ext>
             </a:extLst>
           </p:cNvPr>
@@ -6326,7 +6505,7 @@
           <p:cNvPr id="2" name="Title 1">
             <a:extLst>
               <a:ext uri="{FF2B5EF4-FFF2-40B4-BE49-F238E27FC236}">
-                <a16:creationId xmlns:a16="http://schemas.microsoft.com/office/drawing/2014/main" id="{32D02068-8323-4556-84EA-BA56368ACABB}"/>
+                <a16:creationId xmlns:a16="http://schemas.microsoft.com/office/drawing/2014/main" xmlns="" id="{32D02068-8323-4556-84EA-BA56368ACABB}"/>
               </a:ext>
             </a:extLst>
           </p:cNvPr>
@@ -6354,7 +6533,7 @@
           <p:cNvPr id="8" name="Picture 7">
             <a:extLst>
               <a:ext uri="{FF2B5EF4-FFF2-40B4-BE49-F238E27FC236}">
-                <a16:creationId xmlns:a16="http://schemas.microsoft.com/office/drawing/2014/main" id="{5DE4F861-A192-405F-A3E3-472AF049B6E4}"/>
+                <a16:creationId xmlns:a16="http://schemas.microsoft.com/office/drawing/2014/main" xmlns="" id="{5DE4F861-A192-405F-A3E3-472AF049B6E4}"/>
               </a:ext>
             </a:extLst>
           </p:cNvPr>
@@ -6384,7 +6563,7 @@
           <p:cNvPr id="9" name="Content Placeholder 2">
             <a:extLst>
               <a:ext uri="{FF2B5EF4-FFF2-40B4-BE49-F238E27FC236}">
-                <a16:creationId xmlns:a16="http://schemas.microsoft.com/office/drawing/2014/main" id="{B0194A62-AB5C-418C-9172-6E5E2063DF8F}"/>
+                <a16:creationId xmlns:a16="http://schemas.microsoft.com/office/drawing/2014/main" xmlns="" id="{B0194A62-AB5C-418C-9172-6E5E2063DF8F}"/>
               </a:ext>
             </a:extLst>
           </p:cNvPr>
@@ -6437,7 +6616,7 @@
           <p:cNvPr id="10" name="Table 9">
             <a:extLst>
               <a:ext uri="{FF2B5EF4-FFF2-40B4-BE49-F238E27FC236}">
-                <a16:creationId xmlns:a16="http://schemas.microsoft.com/office/drawing/2014/main" id="{906A3BD4-9DED-40B4-98B8-A47CF9F2D299}"/>
+                <a16:creationId xmlns:a16="http://schemas.microsoft.com/office/drawing/2014/main" xmlns="" id="{906A3BD4-9DED-40B4-98B8-A47CF9F2D299}"/>
               </a:ext>
             </a:extLst>
           </p:cNvPr>
@@ -6466,14 +6645,14 @@
                 <a:gridCol w="766763">
                   <a:extLst>
                     <a:ext uri="{9D8B030D-6E8A-4147-A177-3AD203B41FA5}">
-                      <a16:colId xmlns:a16="http://schemas.microsoft.com/office/drawing/2014/main" val="2637661744"/>
+                      <a16:colId xmlns:a16="http://schemas.microsoft.com/office/drawing/2014/main" xmlns="" val="2637661744"/>
                     </a:ext>
                   </a:extLst>
                 </a:gridCol>
                 <a:gridCol w="766763">
                   <a:extLst>
                     <a:ext uri="{9D8B030D-6E8A-4147-A177-3AD203B41FA5}">
-                      <a16:colId xmlns:a16="http://schemas.microsoft.com/office/drawing/2014/main" val="1516932160"/>
+                      <a16:colId xmlns:a16="http://schemas.microsoft.com/office/drawing/2014/main" xmlns="" val="1516932160"/>
                     </a:ext>
                   </a:extLst>
                 </a:gridCol>
@@ -6611,7 +6790,7 @@
                 </a:tc>
                 <a:extLst>
                   <a:ext uri="{0D108BD9-81ED-4DB2-BD59-A6C34878D82A}">
-                    <a16:rowId xmlns:a16="http://schemas.microsoft.com/office/drawing/2014/main" val="932073288"/>
+                    <a16:rowId xmlns:a16="http://schemas.microsoft.com/office/drawing/2014/main" xmlns="" val="932073288"/>
                   </a:ext>
                 </a:extLst>
               </a:tr>
@@ -6734,7 +6913,7 @@
                 </a:tc>
                 <a:extLst>
                   <a:ext uri="{0D108BD9-81ED-4DB2-BD59-A6C34878D82A}">
-                    <a16:rowId xmlns:a16="http://schemas.microsoft.com/office/drawing/2014/main" val="2966710476"/>
+                    <a16:rowId xmlns:a16="http://schemas.microsoft.com/office/drawing/2014/main" xmlns="" val="2966710476"/>
                   </a:ext>
                 </a:extLst>
               </a:tr>
@@ -6747,7 +6926,7 @@
           <p:cNvPr id="22" name="Group 21">
             <a:extLst>
               <a:ext uri="{FF2B5EF4-FFF2-40B4-BE49-F238E27FC236}">
-                <a16:creationId xmlns:a16="http://schemas.microsoft.com/office/drawing/2014/main" id="{68F260A0-5A17-4C4A-8D0C-80887516FC50}"/>
+                <a16:creationId xmlns:a16="http://schemas.microsoft.com/office/drawing/2014/main" xmlns="" id="{68F260A0-5A17-4C4A-8D0C-80887516FC50}"/>
               </a:ext>
             </a:extLst>
           </p:cNvPr>
@@ -6767,7 +6946,7 @@
             <p:cNvPr id="12" name="Straight Arrow Connector 11">
               <a:extLst>
                 <a:ext uri="{FF2B5EF4-FFF2-40B4-BE49-F238E27FC236}">
-                  <a16:creationId xmlns:a16="http://schemas.microsoft.com/office/drawing/2014/main" id="{EFF130E2-35D3-482B-9A6E-2B2FA5E965D6}"/>
+                  <a16:creationId xmlns:a16="http://schemas.microsoft.com/office/drawing/2014/main" xmlns="" id="{EFF130E2-35D3-482B-9A6E-2B2FA5E965D6}"/>
                 </a:ext>
               </a:extLst>
             </p:cNvPr>
@@ -6807,7 +6986,7 @@
             <p:cNvPr id="13" name="TextBox 12">
               <a:extLst>
                 <a:ext uri="{FF2B5EF4-FFF2-40B4-BE49-F238E27FC236}">
-                  <a16:creationId xmlns:a16="http://schemas.microsoft.com/office/drawing/2014/main" id="{5CED02A3-ED09-405C-8595-5FF4982D27DC}"/>
+                  <a16:creationId xmlns:a16="http://schemas.microsoft.com/office/drawing/2014/main" xmlns="" id="{5CED02A3-ED09-405C-8595-5FF4982D27DC}"/>
                 </a:ext>
               </a:extLst>
             </p:cNvPr>
@@ -6842,7 +7021,7 @@
             <p:cNvPr id="14" name="Straight Arrow Connector 13">
               <a:extLst>
                 <a:ext uri="{FF2B5EF4-FFF2-40B4-BE49-F238E27FC236}">
-                  <a16:creationId xmlns:a16="http://schemas.microsoft.com/office/drawing/2014/main" id="{54229C20-E4B9-48FB-91DD-C8FF1B90C924}"/>
+                  <a16:creationId xmlns:a16="http://schemas.microsoft.com/office/drawing/2014/main" xmlns="" id="{54229C20-E4B9-48FB-91DD-C8FF1B90C924}"/>
                 </a:ext>
               </a:extLst>
             </p:cNvPr>
@@ -6884,7 +7063,7 @@
             <p:cNvPr id="15" name="TextBox 14">
               <a:extLst>
                 <a:ext uri="{FF2B5EF4-FFF2-40B4-BE49-F238E27FC236}">
-                  <a16:creationId xmlns:a16="http://schemas.microsoft.com/office/drawing/2014/main" id="{E3D2F27D-2CF0-447B-A3BC-B479AC647782}"/>
+                  <a16:creationId xmlns:a16="http://schemas.microsoft.com/office/drawing/2014/main" xmlns="" id="{E3D2F27D-2CF0-447B-A3BC-B479AC647782}"/>
                 </a:ext>
               </a:extLst>
             </p:cNvPr>
@@ -6919,7 +7098,7 @@
             <p:cNvPr id="18" name="Oval 17">
               <a:extLst>
                 <a:ext uri="{FF2B5EF4-FFF2-40B4-BE49-F238E27FC236}">
-                  <a16:creationId xmlns:a16="http://schemas.microsoft.com/office/drawing/2014/main" id="{E25F4AB4-50B5-4959-9608-CFB7F144E2D2}"/>
+                  <a16:creationId xmlns:a16="http://schemas.microsoft.com/office/drawing/2014/main" xmlns="" id="{E25F4AB4-50B5-4959-9608-CFB7F144E2D2}"/>
                 </a:ext>
               </a:extLst>
             </p:cNvPr>
@@ -6970,7 +7149,7 @@
             <p:cNvPr id="19" name="TextBox 18">
               <a:extLst>
                 <a:ext uri="{FF2B5EF4-FFF2-40B4-BE49-F238E27FC236}">
-                  <a16:creationId xmlns:a16="http://schemas.microsoft.com/office/drawing/2014/main" id="{1BAC7551-6D05-4F2C-9B59-49FFDD4216FF}"/>
+                  <a16:creationId xmlns:a16="http://schemas.microsoft.com/office/drawing/2014/main" xmlns="" id="{1BAC7551-6D05-4F2C-9B59-49FFDD4216FF}"/>
                 </a:ext>
               </a:extLst>
             </p:cNvPr>
@@ -7005,7 +7184,7 @@
             <p:cNvPr id="21" name="Straight Arrow Connector 20">
               <a:extLst>
                 <a:ext uri="{FF2B5EF4-FFF2-40B4-BE49-F238E27FC236}">
-                  <a16:creationId xmlns:a16="http://schemas.microsoft.com/office/drawing/2014/main" id="{34BD1FB2-E018-49A6-92A9-43E7AF2DC7D1}"/>
+                  <a16:creationId xmlns:a16="http://schemas.microsoft.com/office/drawing/2014/main" xmlns="" id="{34BD1FB2-E018-49A6-92A9-43E7AF2DC7D1}"/>
                 </a:ext>
               </a:extLst>
             </p:cNvPr>
@@ -7048,7 +7227,7 @@
           <p:cNvPr id="23" name="Oval 22">
             <a:extLst>
               <a:ext uri="{FF2B5EF4-FFF2-40B4-BE49-F238E27FC236}">
-                <a16:creationId xmlns:a16="http://schemas.microsoft.com/office/drawing/2014/main" id="{66691EC0-86AF-4180-B2ED-8510E51AB21D}"/>
+                <a16:creationId xmlns:a16="http://schemas.microsoft.com/office/drawing/2014/main" xmlns="" id="{66691EC0-86AF-4180-B2ED-8510E51AB21D}"/>
               </a:ext>
             </a:extLst>
           </p:cNvPr>
@@ -7104,7 +7283,7 @@
           <p:cNvPr id="24" name="TextBox 23">
             <a:extLst>
               <a:ext uri="{FF2B5EF4-FFF2-40B4-BE49-F238E27FC236}">
-                <a16:creationId xmlns:a16="http://schemas.microsoft.com/office/drawing/2014/main" id="{89017DBC-8094-486F-90E2-40C4D4BBE75E}"/>
+                <a16:creationId xmlns:a16="http://schemas.microsoft.com/office/drawing/2014/main" xmlns="" id="{89017DBC-8094-486F-90E2-40C4D4BBE75E}"/>
               </a:ext>
             </a:extLst>
           </p:cNvPr>
@@ -7139,7 +7318,7 @@
           <p:cNvPr id="26" name="Straight Arrow Connector 25">
             <a:extLst>
               <a:ext uri="{FF2B5EF4-FFF2-40B4-BE49-F238E27FC236}">
-                <a16:creationId xmlns:a16="http://schemas.microsoft.com/office/drawing/2014/main" id="{316B0CC6-54B0-4C1D-B5F5-8347D23E1E90}"/>
+                <a16:creationId xmlns:a16="http://schemas.microsoft.com/office/drawing/2014/main" xmlns="" id="{316B0CC6-54B0-4C1D-B5F5-8347D23E1E90}"/>
               </a:ext>
             </a:extLst>
           </p:cNvPr>
@@ -7180,7 +7359,7 @@
           <p:cNvPr id="28" name="Straight Arrow Connector 27">
             <a:extLst>
               <a:ext uri="{FF2B5EF4-FFF2-40B4-BE49-F238E27FC236}">
-                <a16:creationId xmlns:a16="http://schemas.microsoft.com/office/drawing/2014/main" id="{ECAF5419-0C2C-40A6-942E-3DCBF7CAAA86}"/>
+                <a16:creationId xmlns:a16="http://schemas.microsoft.com/office/drawing/2014/main" xmlns="" id="{ECAF5419-0C2C-40A6-942E-3DCBF7CAAA86}"/>
               </a:ext>
             </a:extLst>
           </p:cNvPr>
@@ -7221,7 +7400,7 @@
           <p:cNvPr id="30" name="TextBox 29">
             <a:extLst>
               <a:ext uri="{FF2B5EF4-FFF2-40B4-BE49-F238E27FC236}">
-                <a16:creationId xmlns:a16="http://schemas.microsoft.com/office/drawing/2014/main" id="{FE110A3F-3AA0-4DE0-85CC-72F3195E1C81}"/>
+                <a16:creationId xmlns:a16="http://schemas.microsoft.com/office/drawing/2014/main" xmlns="" id="{FE110A3F-3AA0-4DE0-85CC-72F3195E1C81}"/>
               </a:ext>
             </a:extLst>
           </p:cNvPr>
@@ -7256,7 +7435,7 @@
           <p:cNvPr id="31" name="Slide Number Placeholder 30">
             <a:extLst>
               <a:ext uri="{FF2B5EF4-FFF2-40B4-BE49-F238E27FC236}">
-                <a16:creationId xmlns:a16="http://schemas.microsoft.com/office/drawing/2014/main" id="{625FAD7A-C066-4CEC-ACCA-D8E73D0699F4}"/>
+                <a16:creationId xmlns:a16="http://schemas.microsoft.com/office/drawing/2014/main" xmlns="" id="{625FAD7A-C066-4CEC-ACCA-D8E73D0699F4}"/>
               </a:ext>
             </a:extLst>
           </p:cNvPr>
@@ -7315,7 +7494,7 @@
           <p:cNvPr id="2" name="Title 1">
             <a:extLst>
               <a:ext uri="{FF2B5EF4-FFF2-40B4-BE49-F238E27FC236}">
-                <a16:creationId xmlns:a16="http://schemas.microsoft.com/office/drawing/2014/main" id="{978616E0-8A40-43AD-8A14-1E36B52AF146}"/>
+                <a16:creationId xmlns:a16="http://schemas.microsoft.com/office/drawing/2014/main" xmlns="" id="{978616E0-8A40-43AD-8A14-1E36B52AF146}"/>
               </a:ext>
             </a:extLst>
           </p:cNvPr>
@@ -7343,7 +7522,7 @@
           <p:cNvPr id="22" name="Content Placeholder 2">
             <a:extLst>
               <a:ext uri="{FF2B5EF4-FFF2-40B4-BE49-F238E27FC236}">
-                <a16:creationId xmlns:a16="http://schemas.microsoft.com/office/drawing/2014/main" id="{50505507-F57B-4AEE-83BD-7B59AF4059D6}"/>
+                <a16:creationId xmlns:a16="http://schemas.microsoft.com/office/drawing/2014/main" xmlns="" id="{50505507-F57B-4AEE-83BD-7B59AF4059D6}"/>
               </a:ext>
             </a:extLst>
           </p:cNvPr>
@@ -7563,7 +7742,7 @@
           <p:cNvPr id="28" name="Picture 27">
             <a:extLst>
               <a:ext uri="{FF2B5EF4-FFF2-40B4-BE49-F238E27FC236}">
-                <a16:creationId xmlns:a16="http://schemas.microsoft.com/office/drawing/2014/main" id="{5F230232-7F2B-4D17-9BCB-827B72F1B8CF}"/>
+                <a16:creationId xmlns:a16="http://schemas.microsoft.com/office/drawing/2014/main" xmlns="" id="{5F230232-7F2B-4D17-9BCB-827B72F1B8CF}"/>
               </a:ext>
             </a:extLst>
           </p:cNvPr>
@@ -7599,7 +7778,7 @@
           <p:cNvPr id="29" name="Slide Number Placeholder 28">
             <a:extLst>
               <a:ext uri="{FF2B5EF4-FFF2-40B4-BE49-F238E27FC236}">
-                <a16:creationId xmlns:a16="http://schemas.microsoft.com/office/drawing/2014/main" id="{3653D2AD-A031-46D9-BC35-3EFFABC51A96}"/>
+                <a16:creationId xmlns:a16="http://schemas.microsoft.com/office/drawing/2014/main" xmlns="" id="{3653D2AD-A031-46D9-BC35-3EFFABC51A96}"/>
               </a:ext>
             </a:extLst>
           </p:cNvPr>
@@ -7655,13 +7834,7 @@
       </p:grpSpPr>
       <p:sp>
         <p:nvSpPr>
-          <p:cNvPr id="2" name="Title 1">
-            <a:extLst>
-              <a:ext uri="{FF2B5EF4-FFF2-40B4-BE49-F238E27FC236}">
-                <a16:creationId xmlns:a16="http://schemas.microsoft.com/office/drawing/2014/main" id="{1C9D6DDE-2DFF-4B5C-BAA0-38485F7D0DD1}"/>
-              </a:ext>
-            </a:extLst>
-          </p:cNvPr>
+          <p:cNvPr id="2" name="Title 1"/>
           <p:cNvSpPr>
             <a:spLocks noGrp="1"/>
           </p:cNvSpPr>
@@ -7675,21 +7848,16 @@
           <a:lstStyle/>
           <a:p>
             <a:r>
-              <a:rPr lang="en-US" dirty="0"/>
-              <a:t>Computer Simulation Results</a:t>
-            </a:r>
-          </a:p>
-        </p:txBody>
-      </p:sp>
-      <p:sp>
-        <p:nvSpPr>
-          <p:cNvPr id="3" name="Content Placeholder 2">
-            <a:extLst>
-              <a:ext uri="{FF2B5EF4-FFF2-40B4-BE49-F238E27FC236}">
-                <a16:creationId xmlns:a16="http://schemas.microsoft.com/office/drawing/2014/main" id="{FA6A57F5-60E4-4AC8-A62D-F48394906091}"/>
-              </a:ext>
-            </a:extLst>
-          </p:cNvPr>
+              <a:rPr lang="en-US" dirty="0" smtClean="0"/>
+              <a:t>Plan to Optimize Platoon Maneuver</a:t>
+            </a:r>
+            <a:endParaRPr lang="en-US" dirty="0"/>
+          </a:p>
+        </p:txBody>
+      </p:sp>
+      <p:sp>
+        <p:nvSpPr>
+          <p:cNvPr id="3" name="Content Placeholder 2"/>
           <p:cNvSpPr>
             <a:spLocks noGrp="1"/>
           </p:cNvSpPr>
@@ -7697,42 +7865,42 @@
             <p:ph idx="1"/>
           </p:nvPr>
         </p:nvSpPr>
-        <p:spPr/>
+        <p:spPr>
+          <a:xfrm>
+            <a:off x="838200" y="1825625"/>
+            <a:ext cx="6747164" cy="4351338"/>
+          </a:xfrm>
+        </p:spPr>
         <p:txBody>
           <a:bodyPr/>
           <a:lstStyle/>
           <a:p>
             <a:r>
-              <a:rPr lang="en-US" dirty="0"/>
-              <a:t>Lessons Learned for further computer simulation work</a:t>
-            </a:r>
-          </a:p>
-          <a:p>
-            <a:r>
-              <a:rPr lang="en-US" dirty="0"/>
-              <a:t>Forward Optimization Plans for computer simulation</a:t>
-            </a:r>
-          </a:p>
-          <a:p>
-            <a:r>
-              <a:rPr lang="en-US" dirty="0"/>
-              <a:t>Conclusions drawn from the computer simulation for the end user of the platoon sensor.</a:t>
-            </a:r>
-          </a:p>
-          <a:p>
+              <a:rPr lang="en-US" dirty="0" smtClean="0"/>
+              <a:t>Config.txt text file alongside r2d2_sim.m has the platoon maneuvers for each </a:t>
+            </a:r>
+            <a:r>
+              <a:rPr lang="en-US" dirty="0" err="1" smtClean="0"/>
+              <a:t>heatmap</a:t>
+            </a:r>
+            <a:r>
+              <a:rPr lang="en-US" dirty="0" smtClean="0"/>
+              <a:t> scenario.</a:t>
+            </a:r>
+          </a:p>
+          <a:p>
+            <a:pPr lvl="1"/>
+            <a:r>
+              <a:rPr lang="en-US" dirty="0" smtClean="0"/>
+              <a:t>Can be edited to optimize platoon movement across battlespace.</a:t>
+            </a:r>
             <a:endParaRPr lang="en-US" dirty="0"/>
           </a:p>
         </p:txBody>
       </p:sp>
       <p:sp>
         <p:nvSpPr>
-          <p:cNvPr id="4" name="Slide Number Placeholder 3">
-            <a:extLst>
-              <a:ext uri="{FF2B5EF4-FFF2-40B4-BE49-F238E27FC236}">
-                <a16:creationId xmlns:a16="http://schemas.microsoft.com/office/drawing/2014/main" id="{A9A72C7D-5090-4C31-BBC1-40A54712C1E2}"/>
-              </a:ext>
-            </a:extLst>
-          </p:cNvPr>
+          <p:cNvPr id="4" name="Slide Number Placeholder 3"/>
           <p:cNvSpPr>
             <a:spLocks noGrp="1"/>
           </p:cNvSpPr>
@@ -7753,10 +7921,34 @@
           </a:p>
         </p:txBody>
       </p:sp>
+      <p:pic>
+        <p:nvPicPr>
+          <p:cNvPr id="5" name="Picture 4"/>
+          <p:cNvPicPr>
+            <a:picLocks noChangeAspect="1"/>
+          </p:cNvPicPr>
+          <p:nvPr/>
+        </p:nvPicPr>
+        <p:blipFill>
+          <a:blip r:embed="rId2"/>
+          <a:stretch>
+            <a:fillRect/>
+          </a:stretch>
+        </p:blipFill>
+        <p:spPr>
+          <a:xfrm>
+            <a:off x="7714322" y="1839077"/>
+            <a:ext cx="3371963" cy="4468321"/>
+          </a:xfrm>
+          <a:prstGeom prst="rect">
+            <a:avLst/>
+          </a:prstGeom>
+        </p:spPr>
+      </p:pic>
     </p:spTree>
     <p:extLst>
       <p:ext uri="{BB962C8B-B14F-4D97-AF65-F5344CB8AC3E}">
-        <p14:creationId xmlns:p14="http://schemas.microsoft.com/office/powerpoint/2010/main" val="2154491042"/>
+        <p14:creationId xmlns:p14="http://schemas.microsoft.com/office/powerpoint/2010/main" val="60002077"/>
       </p:ext>
     </p:extLst>
   </p:cSld>
@@ -7788,7 +7980,7 @@
           <p:cNvPr id="2" name="Title 1">
             <a:extLst>
               <a:ext uri="{FF2B5EF4-FFF2-40B4-BE49-F238E27FC236}">
-                <a16:creationId xmlns:a16="http://schemas.microsoft.com/office/drawing/2014/main" id="{C09FFA69-F9C1-46C2-8AC3-FA9CB67DBC59}"/>
+                <a16:creationId xmlns:a16="http://schemas.microsoft.com/office/drawing/2014/main" xmlns="" id="{1C9D6DDE-2DFF-4B5C-BAA0-38485F7D0DD1}"/>
               </a:ext>
             </a:extLst>
           </p:cNvPr>
@@ -7806,7 +7998,7 @@
           <a:p>
             <a:r>
               <a:rPr lang="en-US" dirty="0"/>
-              <a:t>Computer Simulation Results – Lessons Learned #1</a:t>
+              <a:t>Computer Simulation Results</a:t>
             </a:r>
           </a:p>
         </p:txBody>
@@ -7816,7 +8008,7 @@
           <p:cNvPr id="3" name="Content Placeholder 2">
             <a:extLst>
               <a:ext uri="{FF2B5EF4-FFF2-40B4-BE49-F238E27FC236}">
-                <a16:creationId xmlns:a16="http://schemas.microsoft.com/office/drawing/2014/main" id="{DFDFB04B-34EE-42BB-AF8A-799C97D4AE57}"/>
+                <a16:creationId xmlns:a16="http://schemas.microsoft.com/office/drawing/2014/main" xmlns="" id="{FA6A57F5-60E4-4AC8-A62D-F48394906091}"/>
               </a:ext>
             </a:extLst>
           </p:cNvPr>
@@ -7829,42 +8021,28 @@
         </p:nvSpPr>
         <p:spPr/>
         <p:txBody>
-          <a:bodyPr>
-            <a:normAutofit fontScale="92500"/>
-          </a:bodyPr>
+          <a:bodyPr/>
           <a:lstStyle/>
           <a:p>
             <a:r>
               <a:rPr lang="en-US" dirty="0"/>
-              <a:t>In most cases of R2D2 detection, a full maneuvering procedure over many time steps is needed, rather than just a single move away from R2D2 area.</a:t>
+              <a:t>Lessons Learned for further computer simulation work</a:t>
             </a:r>
           </a:p>
           <a:p>
             <a:r>
               <a:rPr lang="en-US" dirty="0"/>
-              <a:t>Just moving the platoon one tick away in the opposite direction from the detected R2D2 will clear the sensor on the next read (since it was the first time it would sense the R2D2), and it will hit the same spot in an endless loop.</a:t>
+              <a:t>Forward Optimization Plans for computer simulation</a:t>
             </a:r>
           </a:p>
           <a:p>
             <a:r>
               <a:rPr lang="en-US" dirty="0"/>
-              <a:t>Therefore, a standard maneuvering scheme can be applied for each heatmap combination to get it out of this potential loop.</a:t>
-            </a:r>
-          </a:p>
-          <a:p>
-            <a:pPr lvl="1"/>
-            <a:r>
-              <a:rPr lang="en-US" dirty="0"/>
-              <a:t>For example: If my heatmap is maximum at NE quadrant/direction (+</a:t>
-            </a:r>
-            <a:r>
-              <a:rPr lang="en-US" dirty="0" err="1"/>
-              <a:t>x,+y</a:t>
-            </a:r>
-            <a:r>
-              <a:rPr lang="en-US" dirty="0"/>
-              <a:t>), I need to setup a maneuver that goes south first a specified number of steps, then heads east a standard number of steps.  Please see slide 5 for illustration.</a:t>
-            </a:r>
+              <a:t>Conclusions drawn from the computer simulation for the end user of the platoon sensor.</a:t>
+            </a:r>
+          </a:p>
+          <a:p>
+            <a:endParaRPr lang="en-US" dirty="0"/>
           </a:p>
         </p:txBody>
       </p:sp>
@@ -7873,7 +8051,7 @@
           <p:cNvPr id="4" name="Slide Number Placeholder 3">
             <a:extLst>
               <a:ext uri="{FF2B5EF4-FFF2-40B4-BE49-F238E27FC236}">
-                <a16:creationId xmlns:a16="http://schemas.microsoft.com/office/drawing/2014/main" id="{1E1C04A7-29B1-4850-B813-90C772E795DB}"/>
+                <a16:creationId xmlns:a16="http://schemas.microsoft.com/office/drawing/2014/main" xmlns="" id="{A9A72C7D-5090-4C31-BBC1-40A54712C1E2}"/>
               </a:ext>
             </a:extLst>
           </p:cNvPr>
@@ -7900,7 +8078,7 @@
     </p:spTree>
     <p:extLst>
       <p:ext uri="{BB962C8B-B14F-4D97-AF65-F5344CB8AC3E}">
-        <p14:creationId xmlns:p14="http://schemas.microsoft.com/office/powerpoint/2010/main" val="909130756"/>
+        <p14:creationId xmlns:p14="http://schemas.microsoft.com/office/powerpoint/2010/main" val="2154491042"/>
       </p:ext>
     </p:extLst>
   </p:cSld>
@@ -7932,7 +8110,7 @@
           <p:cNvPr id="2" name="Title 1">
             <a:extLst>
               <a:ext uri="{FF2B5EF4-FFF2-40B4-BE49-F238E27FC236}">
-                <a16:creationId xmlns:a16="http://schemas.microsoft.com/office/drawing/2014/main" id="{C09FFA69-F9C1-46C2-8AC3-FA9CB67DBC59}"/>
+                <a16:creationId xmlns:a16="http://schemas.microsoft.com/office/drawing/2014/main" xmlns="" id="{C09FFA69-F9C1-46C2-8AC3-FA9CB67DBC59}"/>
               </a:ext>
             </a:extLst>
           </p:cNvPr>
@@ -7950,7 +8128,7 @@
           <a:p>
             <a:r>
               <a:rPr lang="en-US" dirty="0"/>
-              <a:t>Computer Simulation Results – Lessons Learned #2</a:t>
+              <a:t>Computer Simulation Results – Lessons Learned #1</a:t>
             </a:r>
           </a:p>
         </p:txBody>
@@ -7960,7 +8138,7 @@
           <p:cNvPr id="3" name="Content Placeholder 2">
             <a:extLst>
               <a:ext uri="{FF2B5EF4-FFF2-40B4-BE49-F238E27FC236}">
-                <a16:creationId xmlns:a16="http://schemas.microsoft.com/office/drawing/2014/main" id="{DFDFB04B-34EE-42BB-AF8A-799C97D4AE57}"/>
+                <a16:creationId xmlns:a16="http://schemas.microsoft.com/office/drawing/2014/main" xmlns="" id="{DFDFB04B-34EE-42BB-AF8A-799C97D4AE57}"/>
               </a:ext>
             </a:extLst>
           </p:cNvPr>
@@ -7974,27 +8152,40 @@
         <p:spPr/>
         <p:txBody>
           <a:bodyPr>
-            <a:normAutofit/>
+            <a:normAutofit fontScale="92500"/>
           </a:bodyPr>
           <a:lstStyle/>
           <a:p>
             <a:r>
               <a:rPr lang="en-US" dirty="0"/>
-              <a:t>Computer code must be kept maintainable so that programmers can add functionality without adding to the complexity too quickly.  Use objects/structures where possible, and if anything is repeated, generalize it in a function.</a:t>
+              <a:t>In most cases of R2D2 detection, a full maneuvering procedure over many time steps is needed, rather than just a single move away from R2D2 area.</a:t>
             </a:r>
           </a:p>
           <a:p>
             <a:r>
               <a:rPr lang="en-US" dirty="0"/>
-              <a:t>While open source software such as Octave is an extremely appreciated tool, it does not quite match up to </a:t>
+              <a:t>Just moving the platoon one tick away in the opposite direction from the detected R2D2 will clear the sensor on the next read (since it was the first time it would sense the R2D2), and it will hit the same spot in an endless loop.</a:t>
+            </a:r>
+          </a:p>
+          <a:p>
+            <a:r>
+              <a:rPr lang="en-US" dirty="0"/>
+              <a:t>Therefore, a standard maneuvering scheme can be applied for each heatmap combination to get it out of this potential loop.</a:t>
+            </a:r>
+          </a:p>
+          <a:p>
+            <a:pPr lvl="1"/>
+            <a:r>
+              <a:rPr lang="en-US" dirty="0"/>
+              <a:t>For example: If my heatmap is maximum at NE quadrant/direction (+</a:t>
             </a:r>
             <a:r>
               <a:rPr lang="en-US" dirty="0" err="1"/>
-              <a:t>Matlab’s</a:t>
+              <a:t>x,+y</a:t>
             </a:r>
             <a:r>
               <a:rPr lang="en-US" dirty="0"/>
-              <a:t> robustness in terms of debugging and overall IDE quality.  Tried Octave on both Linux Mint and Windows 10, same issues but overall it works.</a:t>
+              <a:t>), I need to setup a maneuver that goes south first a specified number of steps, then heads east a standard number of steps.  Please see slide 5 for illustration.</a:t>
             </a:r>
           </a:p>
         </p:txBody>
@@ -8004,7 +8195,7 @@
           <p:cNvPr id="4" name="Slide Number Placeholder 3">
             <a:extLst>
               <a:ext uri="{FF2B5EF4-FFF2-40B4-BE49-F238E27FC236}">
-                <a16:creationId xmlns:a16="http://schemas.microsoft.com/office/drawing/2014/main" id="{1E1C04A7-29B1-4850-B813-90C772E795DB}"/>
+                <a16:creationId xmlns:a16="http://schemas.microsoft.com/office/drawing/2014/main" xmlns="" id="{1E1C04A7-29B1-4850-B813-90C772E795DB}"/>
               </a:ext>
             </a:extLst>
           </p:cNvPr>
@@ -8031,7 +8222,7 @@
     </p:spTree>
     <p:extLst>
       <p:ext uri="{BB962C8B-B14F-4D97-AF65-F5344CB8AC3E}">
-        <p14:creationId xmlns:p14="http://schemas.microsoft.com/office/powerpoint/2010/main" val="133390856"/>
+        <p14:creationId xmlns:p14="http://schemas.microsoft.com/office/powerpoint/2010/main" val="909130756"/>
       </p:ext>
     </p:extLst>
   </p:cSld>

</xml_diff>